<commit_message>
updated stake holder presentation
updated stake holder presentation
</commit_message>
<xml_diff>
--- a/NFL Game Predictions.pptx
+++ b/NFL Game Predictions.pptx
@@ -7,25 +7,27 @@
   </p:sldMasterIdLst>
   <p:sldIdLst>
     <p:sldId id="256" r:id="rId3"/>
-    <p:sldId id="257" r:id="rId4"/>
-    <p:sldId id="258" r:id="rId5"/>
-    <p:sldId id="259" r:id="rId6"/>
-    <p:sldId id="260" r:id="rId7"/>
-    <p:sldId id="261" r:id="rId8"/>
-    <p:sldId id="262" r:id="rId9"/>
-    <p:sldId id="263" r:id="rId10"/>
-    <p:sldId id="264" r:id="rId11"/>
-    <p:sldId id="265" r:id="rId12"/>
-    <p:sldId id="266" r:id="rId13"/>
-    <p:sldId id="267" r:id="rId14"/>
-    <p:sldId id="268" r:id="rId15"/>
-    <p:sldId id="269" r:id="rId16"/>
-    <p:sldId id="270" r:id="rId17"/>
-    <p:sldId id="271" r:id="rId18"/>
-    <p:sldId id="272" r:id="rId19"/>
-    <p:sldId id="273" r:id="rId20"/>
-    <p:sldId id="274" r:id="rId21"/>
-    <p:sldId id="275" r:id="rId22"/>
+    <p:sldId id="276" r:id="rId4"/>
+    <p:sldId id="277" r:id="rId5"/>
+    <p:sldId id="257" r:id="rId6"/>
+    <p:sldId id="258" r:id="rId7"/>
+    <p:sldId id="259" r:id="rId8"/>
+    <p:sldId id="260" r:id="rId9"/>
+    <p:sldId id="261" r:id="rId10"/>
+    <p:sldId id="262" r:id="rId11"/>
+    <p:sldId id="263" r:id="rId12"/>
+    <p:sldId id="264" r:id="rId13"/>
+    <p:sldId id="265" r:id="rId14"/>
+    <p:sldId id="266" r:id="rId15"/>
+    <p:sldId id="267" r:id="rId16"/>
+    <p:sldId id="268" r:id="rId17"/>
+    <p:sldId id="269" r:id="rId18"/>
+    <p:sldId id="270" r:id="rId19"/>
+    <p:sldId id="271" r:id="rId20"/>
+    <p:sldId id="272" r:id="rId21"/>
+    <p:sldId id="273" r:id="rId22"/>
+    <p:sldId id="274" r:id="rId23"/>
+    <p:sldId id="275" r:id="rId24"/>
   </p:sldIdLst>
   <p:sldSz cx="12192000" cy="6858000"/>
   <p:notesSz cx="6858000" cy="9144000"/>
@@ -154,6 +156,11 @@
       </a:defRPr>
     </a:lvl9pPr>
   </p:defaultTextStyle>
+  <p:extLst>
+    <p:ext uri="{EFAFB233-063F-42B5-8137-9DF3F51BA10A}">
+      <p15:sldGuideLst xmlns:p15="http://schemas.microsoft.com/office/powerpoint/2012/main"/>
+    </p:ext>
+  </p:extLst>
 </p:presentation>
 </file>
 
@@ -6116,6 +6123,358 @@
           <p:cNvPr id="2" name="Title 1">
             <a:extLst>
               <a:ext uri="{FF2B5EF4-FFF2-40B4-BE49-F238E27FC236}">
+                <a16:creationId xmlns:a16="http://schemas.microsoft.com/office/drawing/2014/main" id="{6675A976-532A-0662-5812-9A8AC9EF2185}"/>
+              </a:ext>
+            </a:extLst>
+          </p:cNvPr>
+          <p:cNvSpPr>
+            <a:spLocks noGrp="1"/>
+          </p:cNvSpPr>
+          <p:nvPr>
+            <p:ph type="title"/>
+          </p:nvPr>
+        </p:nvSpPr>
+        <p:spPr/>
+        <p:txBody>
+          <a:bodyPr/>
+          <a:lstStyle/>
+          <a:p>
+            <a:r>
+              <a:rPr lang="en-US" dirty="0"/>
+              <a:t>EDA</a:t>
+            </a:r>
+            <a:br>
+              <a:rPr lang="en-US" dirty="0"/>
+            </a:br>
+            <a:r>
+              <a:rPr lang="en-US" dirty="0"/>
+              <a:t>Continued:</a:t>
+            </a:r>
+          </a:p>
+        </p:txBody>
+      </p:sp>
+      <p:pic>
+        <p:nvPicPr>
+          <p:cNvPr id="5" name="Content Placeholder 4" descr="A graph with numbers and a bar graph&#10;&#10;Description automatically generated with medium confidence">
+            <a:extLst>
+              <a:ext uri="{FF2B5EF4-FFF2-40B4-BE49-F238E27FC236}">
+                <a16:creationId xmlns:a16="http://schemas.microsoft.com/office/drawing/2014/main" id="{6B03BAC3-F0AD-E06A-8C38-762C6E694BB8}"/>
+              </a:ext>
+            </a:extLst>
+          </p:cNvPr>
+          <p:cNvPicPr>
+            <a:picLocks noGrp="1" noChangeAspect="1"/>
+          </p:cNvPicPr>
+          <p:nvPr>
+            <p:ph idx="1"/>
+          </p:nvPr>
+        </p:nvPicPr>
+        <p:blipFill>
+          <a:blip r:embed="rId2">
+            <a:extLst>
+              <a:ext uri="{28A0092B-C50C-407E-A947-70E740481C1C}">
+                <a14:useLocalDpi xmlns:a14="http://schemas.microsoft.com/office/drawing/2010/main" val="0"/>
+              </a:ext>
+            </a:extLst>
+          </a:blip>
+          <a:stretch>
+            <a:fillRect/>
+          </a:stretch>
+        </p:blipFill>
+        <p:spPr>
+          <a:xfrm>
+            <a:off x="6057029" y="1844675"/>
+            <a:ext cx="6134971" cy="4089980"/>
+          </a:xfrm>
+        </p:spPr>
+      </p:pic>
+      <p:sp>
+        <p:nvSpPr>
+          <p:cNvPr id="6" name="TextBox 5">
+            <a:extLst>
+              <a:ext uri="{FF2B5EF4-FFF2-40B4-BE49-F238E27FC236}">
+                <a16:creationId xmlns:a16="http://schemas.microsoft.com/office/drawing/2014/main" id="{29AD7016-570C-E636-A388-7080252DD0CC}"/>
+              </a:ext>
+            </a:extLst>
+          </p:cNvPr>
+          <p:cNvSpPr txBox="1"/>
+          <p:nvPr/>
+        </p:nvSpPr>
+        <p:spPr>
+          <a:xfrm>
+            <a:off x="376271" y="1844675"/>
+            <a:ext cx="5719729" cy="4555093"/>
+          </a:xfrm>
+          <a:prstGeom prst="rect">
+            <a:avLst/>
+          </a:prstGeom>
+          <a:noFill/>
+        </p:spPr>
+        <p:txBody>
+          <a:bodyPr wrap="square" rtlCol="0">
+            <a:spAutoFit/>
+          </a:bodyPr>
+          <a:lstStyle/>
+          <a:p>
+            <a:r>
+              <a:rPr lang="en-US" b="0" dirty="0">
+                <a:solidFill>
+                  <a:schemeClr val="tx2"/>
+                </a:solidFill>
+              </a:rPr>
+              <a:t>This heatmap shows the correlation between the other features and the target feature. One thing that jumps out is that some of the features are inversely correlated.</a:t>
+            </a:r>
+          </a:p>
+          <a:p>
+            <a:endParaRPr lang="en-US" b="0" dirty="0">
+              <a:solidFill>
+                <a:schemeClr val="tx2"/>
+              </a:solidFill>
+            </a:endParaRPr>
+          </a:p>
+          <a:p>
+            <a:r>
+              <a:rPr lang="en-US" b="0" dirty="0">
+                <a:solidFill>
+                  <a:schemeClr val="tx2"/>
+                </a:solidFill>
+              </a:rPr>
+              <a:t>PC3 seems to have a fairly high inverse correlation, while other did not have much correlation at all.</a:t>
+            </a:r>
+          </a:p>
+          <a:p>
+            <a:endParaRPr lang="en-US" b="0" dirty="0">
+              <a:solidFill>
+                <a:schemeClr val="tx2"/>
+              </a:solidFill>
+            </a:endParaRPr>
+          </a:p>
+          <a:p>
+            <a:r>
+              <a:rPr lang="en-US" b="0" dirty="0">
+                <a:solidFill>
+                  <a:schemeClr val="tx2"/>
+                </a:solidFill>
+              </a:rPr>
+              <a:t>This worried me at first because I did want to drop so much data that the prediction model would only be working with a small number of factors.</a:t>
+            </a:r>
+          </a:p>
+          <a:p>
+            <a:endParaRPr lang="en-US" b="0" dirty="0">
+              <a:solidFill>
+                <a:schemeClr val="tx2"/>
+              </a:solidFill>
+            </a:endParaRPr>
+          </a:p>
+          <a:p>
+            <a:r>
+              <a:rPr lang="en-US" b="0" dirty="0">
+                <a:solidFill>
+                  <a:schemeClr val="tx2"/>
+                </a:solidFill>
+              </a:rPr>
+              <a:t>Because of that I decided to continue with those features and see how the prediction power of the model came out.</a:t>
+            </a:r>
+          </a:p>
+          <a:p>
+            <a:endParaRPr lang="en-US" sz="2000" b="0" dirty="0"/>
+          </a:p>
+        </p:txBody>
+      </p:sp>
+    </p:spTree>
+    <p:extLst>
+      <p:ext uri="{BB962C8B-B14F-4D97-AF65-F5344CB8AC3E}">
+        <p14:creationId xmlns:p14="http://schemas.microsoft.com/office/powerpoint/2010/main" val="261619700"/>
+      </p:ext>
+    </p:extLst>
+  </p:cSld>
+  <p:clrMapOvr>
+    <a:masterClrMapping/>
+  </p:clrMapOvr>
+</p:sld>
+</file>
+
+<file path=ppt/slides/slide11.xml><?xml version="1.0" encoding="utf-8"?>
+<p:sld xmlns:a="http://schemas.openxmlformats.org/drawingml/2006/main" xmlns:r="http://schemas.openxmlformats.org/officeDocument/2006/relationships" xmlns:p="http://schemas.openxmlformats.org/presentationml/2006/main">
+  <p:cSld>
+    <p:spTree>
+      <p:nvGrpSpPr>
+        <p:cNvPr id="1" name=""/>
+        <p:cNvGrpSpPr/>
+        <p:nvPr/>
+      </p:nvGrpSpPr>
+      <p:grpSpPr>
+        <a:xfrm>
+          <a:off x="0" y="0"/>
+          <a:ext cx="0" cy="0"/>
+          <a:chOff x="0" y="0"/>
+          <a:chExt cx="0" cy="0"/>
+        </a:xfrm>
+      </p:grpSpPr>
+      <p:sp>
+        <p:nvSpPr>
+          <p:cNvPr id="2" name="Title 1">
+            <a:extLst>
+              <a:ext uri="{FF2B5EF4-FFF2-40B4-BE49-F238E27FC236}">
+                <a16:creationId xmlns:a16="http://schemas.microsoft.com/office/drawing/2014/main" id="{FC3C6141-472A-EF61-9BDF-A0F6BC23FF8B}"/>
+              </a:ext>
+            </a:extLst>
+          </p:cNvPr>
+          <p:cNvSpPr>
+            <a:spLocks noGrp="1"/>
+          </p:cNvSpPr>
+          <p:nvPr>
+            <p:ph type="title"/>
+          </p:nvPr>
+        </p:nvSpPr>
+        <p:spPr/>
+        <p:txBody>
+          <a:bodyPr/>
+          <a:lstStyle/>
+          <a:p>
+            <a:r>
+              <a:rPr lang="en-US" dirty="0"/>
+              <a:t>Model Building:</a:t>
+            </a:r>
+          </a:p>
+        </p:txBody>
+      </p:sp>
+      <p:sp>
+        <p:nvSpPr>
+          <p:cNvPr id="3" name="Content Placeholder 2">
+            <a:extLst>
+              <a:ext uri="{FF2B5EF4-FFF2-40B4-BE49-F238E27FC236}">
+                <a16:creationId xmlns:a16="http://schemas.microsoft.com/office/drawing/2014/main" id="{4193B80A-DCBE-4D88-75A6-7C3B5EBA5AA2}"/>
+              </a:ext>
+            </a:extLst>
+          </p:cNvPr>
+          <p:cNvSpPr>
+            <a:spLocks noGrp="1"/>
+          </p:cNvSpPr>
+          <p:nvPr>
+            <p:ph idx="1"/>
+          </p:nvPr>
+        </p:nvSpPr>
+        <p:spPr>
+          <a:xfrm>
+            <a:off x="253667" y="1717973"/>
+            <a:ext cx="11406510" cy="2223406"/>
+          </a:xfrm>
+        </p:spPr>
+        <p:txBody>
+          <a:bodyPr/>
+          <a:lstStyle/>
+          <a:p>
+            <a:pPr marL="0" indent="0">
+              <a:buNone/>
+            </a:pPr>
+            <a:r>
+              <a:rPr lang="en-US" sz="1800" dirty="0"/>
+              <a:t>Once I had examined the data I was working with, it was on to model building.</a:t>
+            </a:r>
+          </a:p>
+          <a:p>
+            <a:pPr marL="0" indent="0">
+              <a:buNone/>
+            </a:pPr>
+            <a:endParaRPr lang="en-US" sz="1800" dirty="0"/>
+          </a:p>
+          <a:p>
+            <a:pPr marL="0" indent="0">
+              <a:buNone/>
+            </a:pPr>
+            <a:r>
+              <a:rPr lang="en-US" sz="1800" dirty="0"/>
+              <a:t>To do this I decided to use PyCaret, due to its simplicity, integration with many models and overall ease of use.</a:t>
+            </a:r>
+          </a:p>
+          <a:p>
+            <a:pPr marL="0" indent="0">
+              <a:buNone/>
+            </a:pPr>
+            <a:endParaRPr lang="en-US" sz="1800" dirty="0"/>
+          </a:p>
+          <a:p>
+            <a:pPr marL="0" indent="0">
+              <a:buNone/>
+            </a:pPr>
+            <a:r>
+              <a:rPr lang="en-US" sz="1800" dirty="0"/>
+              <a:t>I first needed to determine which model or models I would use, so I ran a model comparison on the training data.</a:t>
+            </a:r>
+          </a:p>
+        </p:txBody>
+      </p:sp>
+      <p:sp>
+        <p:nvSpPr>
+          <p:cNvPr id="4" name="TextBox 3">
+            <a:extLst>
+              <a:ext uri="{FF2B5EF4-FFF2-40B4-BE49-F238E27FC236}">
+                <a16:creationId xmlns:a16="http://schemas.microsoft.com/office/drawing/2014/main" id="{AE947101-87E8-85B2-4C69-CE94CDD4DB26}"/>
+              </a:ext>
+            </a:extLst>
+          </p:cNvPr>
+          <p:cNvSpPr txBox="1"/>
+          <p:nvPr/>
+        </p:nvSpPr>
+        <p:spPr>
+          <a:xfrm>
+            <a:off x="253667" y="3941379"/>
+            <a:ext cx="11406509" cy="923330"/>
+          </a:xfrm>
+          <a:prstGeom prst="rect">
+            <a:avLst/>
+          </a:prstGeom>
+          <a:noFill/>
+        </p:spPr>
+        <p:txBody>
+          <a:bodyPr wrap="square" rtlCol="0">
+            <a:spAutoFit/>
+          </a:bodyPr>
+          <a:lstStyle/>
+          <a:p>
+            <a:r>
+              <a:rPr lang="en-US" b="0" dirty="0"/>
+              <a:t>I split our whole data into 2 parts. 10% would be set aside as a validation, and the rest would be used in experiment setup. It should be noted that PyCaret makes a holdout set when you use the setup experiment method. In this case, I chose to take 15% of the data as a holdout set.</a:t>
+            </a:r>
+          </a:p>
+        </p:txBody>
+      </p:sp>
+    </p:spTree>
+    <p:extLst>
+      <p:ext uri="{BB962C8B-B14F-4D97-AF65-F5344CB8AC3E}">
+        <p14:creationId xmlns:p14="http://schemas.microsoft.com/office/powerpoint/2010/main" val="3211096387"/>
+      </p:ext>
+    </p:extLst>
+  </p:cSld>
+  <p:clrMapOvr>
+    <a:masterClrMapping/>
+  </p:clrMapOvr>
+</p:sld>
+</file>
+
+<file path=ppt/slides/slide12.xml><?xml version="1.0" encoding="utf-8"?>
+<p:sld xmlns:a="http://schemas.openxmlformats.org/drawingml/2006/main" xmlns:r="http://schemas.openxmlformats.org/officeDocument/2006/relationships" xmlns:p="http://schemas.openxmlformats.org/presentationml/2006/main">
+  <p:cSld>
+    <p:spTree>
+      <p:nvGrpSpPr>
+        <p:cNvPr id="1" name=""/>
+        <p:cNvGrpSpPr/>
+        <p:nvPr/>
+      </p:nvGrpSpPr>
+      <p:grpSpPr>
+        <a:xfrm>
+          <a:off x="0" y="0"/>
+          <a:ext cx="0" cy="0"/>
+          <a:chOff x="0" y="0"/>
+          <a:chExt cx="0" cy="0"/>
+        </a:xfrm>
+      </p:grpSpPr>
+      <p:sp>
+        <p:nvSpPr>
+          <p:cNvPr id="2" name="Title 1">
+            <a:extLst>
+              <a:ext uri="{FF2B5EF4-FFF2-40B4-BE49-F238E27FC236}">
                 <a16:creationId xmlns:a16="http://schemas.microsoft.com/office/drawing/2014/main" id="{85822071-C23E-3C0D-A4E9-76CD1215B647}"/>
               </a:ext>
             </a:extLst>
@@ -6281,7 +6640,7 @@
 </p:sld>
 </file>
 
-<file path=ppt/slides/slide11.xml><?xml version="1.0" encoding="utf-8"?>
+<file path=ppt/slides/slide13.xml><?xml version="1.0" encoding="utf-8"?>
 <p:sld xmlns:a="http://schemas.openxmlformats.org/drawingml/2006/main" xmlns:r="http://schemas.openxmlformats.org/officeDocument/2006/relationships" xmlns:p="http://schemas.openxmlformats.org/presentationml/2006/main">
   <p:cSld>
     <p:spTree>
@@ -6448,7 +6807,7 @@
 </p:sld>
 </file>
 
-<file path=ppt/slides/slide12.xml><?xml version="1.0" encoding="utf-8"?>
+<file path=ppt/slides/slide14.xml><?xml version="1.0" encoding="utf-8"?>
 <p:sld xmlns:a="http://schemas.openxmlformats.org/drawingml/2006/main" xmlns:r="http://schemas.openxmlformats.org/officeDocument/2006/relationships" xmlns:p="http://schemas.openxmlformats.org/presentationml/2006/main">
   <p:cSld>
     <p:spTree>
@@ -6588,7 +6947,7 @@
 </p:sld>
 </file>
 
-<file path=ppt/slides/slide13.xml><?xml version="1.0" encoding="utf-8"?>
+<file path=ppt/slides/slide15.xml><?xml version="1.0" encoding="utf-8"?>
 <p:sld xmlns:a="http://schemas.openxmlformats.org/drawingml/2006/main" xmlns:r="http://schemas.openxmlformats.org/officeDocument/2006/relationships" xmlns:p="http://schemas.openxmlformats.org/presentationml/2006/main">
   <p:cSld>
     <p:spTree>
@@ -6725,7 +7084,7 @@
 </p:sld>
 </file>
 
-<file path=ppt/slides/slide14.xml><?xml version="1.0" encoding="utf-8"?>
+<file path=ppt/slides/slide16.xml><?xml version="1.0" encoding="utf-8"?>
 <p:sld xmlns:a="http://schemas.openxmlformats.org/drawingml/2006/main" xmlns:r="http://schemas.openxmlformats.org/officeDocument/2006/relationships" xmlns:p="http://schemas.openxmlformats.org/presentationml/2006/main">
   <p:cSld>
     <p:spTree>
@@ -6870,7 +7229,7 @@
 </p:sld>
 </file>
 
-<file path=ppt/slides/slide15.xml><?xml version="1.0" encoding="utf-8"?>
+<file path=ppt/slides/slide17.xml><?xml version="1.0" encoding="utf-8"?>
 <p:sld xmlns:a="http://schemas.openxmlformats.org/drawingml/2006/main" xmlns:r="http://schemas.openxmlformats.org/officeDocument/2006/relationships" xmlns:p="http://schemas.openxmlformats.org/presentationml/2006/main">
   <p:cSld>
     <p:spTree>
@@ -7011,7 +7370,7 @@
 </p:sld>
 </file>
 
-<file path=ppt/slides/slide16.xml><?xml version="1.0" encoding="utf-8"?>
+<file path=ppt/slides/slide18.xml><?xml version="1.0" encoding="utf-8"?>
 <p:sld xmlns:a="http://schemas.openxmlformats.org/drawingml/2006/main" xmlns:r="http://schemas.openxmlformats.org/officeDocument/2006/relationships" xmlns:p="http://schemas.openxmlformats.org/presentationml/2006/main">
   <p:cSld>
     <p:spTree>
@@ -7152,7 +7511,7 @@
 </p:sld>
 </file>
 
-<file path=ppt/slides/slide17.xml><?xml version="1.0" encoding="utf-8"?>
+<file path=ppt/slides/slide19.xml><?xml version="1.0" encoding="utf-8"?>
 <p:sld xmlns:a="http://schemas.openxmlformats.org/drawingml/2006/main" xmlns:r="http://schemas.openxmlformats.org/officeDocument/2006/relationships" xmlns:p="http://schemas.openxmlformats.org/presentationml/2006/main">
   <p:cSld>
     <p:spTree>
@@ -7293,373 +7652,6 @@
 </p:sld>
 </file>
 
-<file path=ppt/slides/slide18.xml><?xml version="1.0" encoding="utf-8"?>
-<p:sld xmlns:a="http://schemas.openxmlformats.org/drawingml/2006/main" xmlns:r="http://schemas.openxmlformats.org/officeDocument/2006/relationships" xmlns:p="http://schemas.openxmlformats.org/presentationml/2006/main">
-  <p:cSld>
-    <p:spTree>
-      <p:nvGrpSpPr>
-        <p:cNvPr id="1" name=""/>
-        <p:cNvGrpSpPr/>
-        <p:nvPr/>
-      </p:nvGrpSpPr>
-      <p:grpSpPr>
-        <a:xfrm>
-          <a:off x="0" y="0"/>
-          <a:ext cx="0" cy="0"/>
-          <a:chOff x="0" y="0"/>
-          <a:chExt cx="0" cy="0"/>
-        </a:xfrm>
-      </p:grpSpPr>
-      <p:sp>
-        <p:nvSpPr>
-          <p:cNvPr id="2" name="Title 1">
-            <a:extLst>
-              <a:ext uri="{FF2B5EF4-FFF2-40B4-BE49-F238E27FC236}">
-                <a16:creationId xmlns:a16="http://schemas.microsoft.com/office/drawing/2014/main" id="{1886A7C9-6977-CB1D-B782-A197B509C068}"/>
-              </a:ext>
-            </a:extLst>
-          </p:cNvPr>
-          <p:cNvSpPr>
-            <a:spLocks noGrp="1"/>
-          </p:cNvSpPr>
-          <p:nvPr>
-            <p:ph type="title"/>
-          </p:nvPr>
-        </p:nvSpPr>
-        <p:spPr/>
-        <p:txBody>
-          <a:bodyPr/>
-          <a:lstStyle/>
-          <a:p>
-            <a:r>
-              <a:rPr lang="en-US" dirty="0"/>
-              <a:t>Conclusion:</a:t>
-            </a:r>
-          </a:p>
-        </p:txBody>
-      </p:sp>
-      <p:sp>
-        <p:nvSpPr>
-          <p:cNvPr id="3" name="Content Placeholder 2">
-            <a:extLst>
-              <a:ext uri="{FF2B5EF4-FFF2-40B4-BE49-F238E27FC236}">
-                <a16:creationId xmlns:a16="http://schemas.microsoft.com/office/drawing/2014/main" id="{FCF67E0D-2958-39B6-D214-C6512F1FF746}"/>
-              </a:ext>
-            </a:extLst>
-          </p:cNvPr>
-          <p:cNvSpPr>
-            <a:spLocks noGrp="1"/>
-          </p:cNvSpPr>
-          <p:nvPr>
-            <p:ph idx="1"/>
-          </p:nvPr>
-        </p:nvSpPr>
-        <p:spPr>
-          <a:xfrm>
-            <a:off x="814918" y="1989140"/>
-            <a:ext cx="10562167" cy="3144112"/>
-          </a:xfrm>
-        </p:spPr>
-        <p:txBody>
-          <a:bodyPr/>
-          <a:lstStyle/>
-          <a:p>
-            <a:r>
-              <a:rPr lang="en-US" sz="1400" b="1" i="0" dirty="0">
-                <a:solidFill>
-                  <a:schemeClr val="tx2"/>
-                </a:solidFill>
-                <a:effectLst/>
-                <a:cs typeface="Arial" panose="020B0604020202020204" pitchFamily="34" charset="0"/>
-              </a:rPr>
-              <a:t>Accuracy (92.73%):</a:t>
-            </a:r>
-            <a:r>
-              <a:rPr lang="en-US" sz="1400" b="0" i="0" dirty="0">
-                <a:solidFill>
-                  <a:schemeClr val="tx2"/>
-                </a:solidFill>
-                <a:effectLst/>
-                <a:cs typeface="Arial" panose="020B0604020202020204" pitchFamily="34" charset="0"/>
-              </a:rPr>
-              <a:t> This score indicates that the model correctly predicts the outcome (win/loss) of an NFL game approximately 92.73% of the time. In the context of game predictions, this high accuracy means that the model can be considered highly reliable for forecasting game results.</a:t>
-            </a:r>
-          </a:p>
-          <a:p>
-            <a:r>
-              <a:rPr lang="en-US" sz="1400" b="1" i="0" dirty="0">
-                <a:solidFill>
-                  <a:schemeClr val="tx2"/>
-                </a:solidFill>
-                <a:effectLst/>
-                <a:cs typeface="Arial" panose="020B0604020202020204" pitchFamily="34" charset="0"/>
-              </a:rPr>
-              <a:t>AUC (96.43%):</a:t>
-            </a:r>
-            <a:r>
-              <a:rPr lang="en-US" sz="1400" b="0" i="0" dirty="0">
-                <a:solidFill>
-                  <a:schemeClr val="tx2"/>
-                </a:solidFill>
-                <a:effectLst/>
-                <a:cs typeface="Arial" panose="020B0604020202020204" pitchFamily="34" charset="0"/>
-              </a:rPr>
-              <a:t> The Area Under the Receiver Operating Characteristic Curve measures the model's ability to distinguish between winning and losing outcomes. A score of 96.43% signifies excellent separation, implying that the model has a strong understanding of the factors that contribute to a win or loss.</a:t>
-            </a:r>
-          </a:p>
-          <a:p>
-            <a:r>
-              <a:rPr lang="en-US" sz="1400" b="1" i="0" dirty="0">
-                <a:solidFill>
-                  <a:schemeClr val="tx2"/>
-                </a:solidFill>
-                <a:effectLst/>
-                <a:cs typeface="Arial" panose="020B0604020202020204" pitchFamily="34" charset="0"/>
-              </a:rPr>
-              <a:t>Recall (96.43%):</a:t>
-            </a:r>
-            <a:r>
-              <a:rPr lang="en-US" sz="1400" b="0" i="0" dirty="0">
-                <a:solidFill>
-                  <a:schemeClr val="tx2"/>
-                </a:solidFill>
-                <a:effectLst/>
-                <a:cs typeface="Arial" panose="020B0604020202020204" pitchFamily="34" charset="0"/>
-              </a:rPr>
-              <a:t> Recall measures the model's ability to correctly identify all actual winning games. A high recall like 96.43% suggests that the model rarely misses a true winning game, making it valuable for applications where capturing all winning instances is crucial.</a:t>
-            </a:r>
-          </a:p>
-          <a:p>
-            <a:r>
-              <a:rPr lang="en-US" sz="1400" b="1" i="0" dirty="0">
-                <a:solidFill>
-                  <a:schemeClr val="tx2"/>
-                </a:solidFill>
-                <a:effectLst/>
-                <a:cs typeface="Arial" panose="020B0604020202020204" pitchFamily="34" charset="0"/>
-              </a:rPr>
-              <a:t>Precision (90.00%):</a:t>
-            </a:r>
-            <a:r>
-              <a:rPr lang="en-US" sz="1400" b="0" i="0" dirty="0">
-                <a:solidFill>
-                  <a:schemeClr val="tx2"/>
-                </a:solidFill>
-                <a:effectLst/>
-                <a:cs typeface="Arial" panose="020B0604020202020204" pitchFamily="34" charset="0"/>
-              </a:rPr>
-              <a:t> Precision assesses the model's ability to accurately predict a win without falsely identifying a loss as a win. A precision of 90% means that among the games predicted as wins, 90% were actual wins. This is particularly important in scenarios where false positives (incorrectly predicting a win) can have significant consequences, such as in betting or strategic planning.</a:t>
-            </a:r>
-          </a:p>
-        </p:txBody>
-      </p:sp>
-    </p:spTree>
-    <p:extLst>
-      <p:ext uri="{BB962C8B-B14F-4D97-AF65-F5344CB8AC3E}">
-        <p14:creationId xmlns:p14="http://schemas.microsoft.com/office/powerpoint/2010/main" val="1078846726"/>
-      </p:ext>
-    </p:extLst>
-  </p:cSld>
-  <p:clrMapOvr>
-    <a:masterClrMapping/>
-  </p:clrMapOvr>
-</p:sld>
-</file>
-
-<file path=ppt/slides/slide19.xml><?xml version="1.0" encoding="utf-8"?>
-<p:sld xmlns:a="http://schemas.openxmlformats.org/drawingml/2006/main" xmlns:r="http://schemas.openxmlformats.org/officeDocument/2006/relationships" xmlns:p="http://schemas.openxmlformats.org/presentationml/2006/main">
-  <p:cSld>
-    <p:spTree>
-      <p:nvGrpSpPr>
-        <p:cNvPr id="1" name=""/>
-        <p:cNvGrpSpPr/>
-        <p:nvPr/>
-      </p:nvGrpSpPr>
-      <p:grpSpPr>
-        <a:xfrm>
-          <a:off x="0" y="0"/>
-          <a:ext cx="0" cy="0"/>
-          <a:chOff x="0" y="0"/>
-          <a:chExt cx="0" cy="0"/>
-        </a:xfrm>
-      </p:grpSpPr>
-      <p:sp>
-        <p:nvSpPr>
-          <p:cNvPr id="2" name="Title 1">
-            <a:extLst>
-              <a:ext uri="{FF2B5EF4-FFF2-40B4-BE49-F238E27FC236}">
-                <a16:creationId xmlns:a16="http://schemas.microsoft.com/office/drawing/2014/main" id="{2265864F-5421-1F4D-A809-13983CC3EB45}"/>
-              </a:ext>
-            </a:extLst>
-          </p:cNvPr>
-          <p:cNvSpPr>
-            <a:spLocks noGrp="1"/>
-          </p:cNvSpPr>
-          <p:nvPr>
-            <p:ph type="title"/>
-          </p:nvPr>
-        </p:nvSpPr>
-        <p:spPr/>
-        <p:txBody>
-          <a:bodyPr/>
-          <a:lstStyle/>
-          <a:p>
-            <a:r>
-              <a:rPr lang="en-US" dirty="0"/>
-              <a:t>Conclusion</a:t>
-            </a:r>
-            <a:br>
-              <a:rPr lang="en-US" dirty="0"/>
-            </a:br>
-            <a:r>
-              <a:rPr lang="en-US" dirty="0"/>
-              <a:t>Continued:</a:t>
-            </a:r>
-          </a:p>
-        </p:txBody>
-      </p:sp>
-      <p:sp>
-        <p:nvSpPr>
-          <p:cNvPr id="3" name="Content Placeholder 2">
-            <a:extLst>
-              <a:ext uri="{FF2B5EF4-FFF2-40B4-BE49-F238E27FC236}">
-                <a16:creationId xmlns:a16="http://schemas.microsoft.com/office/drawing/2014/main" id="{38E7855A-91D2-3B33-2D4A-90998D8461C8}"/>
-              </a:ext>
-            </a:extLst>
-          </p:cNvPr>
-          <p:cNvSpPr>
-            <a:spLocks noGrp="1"/>
-          </p:cNvSpPr>
-          <p:nvPr>
-            <p:ph idx="1"/>
-          </p:nvPr>
-        </p:nvSpPr>
-        <p:spPr/>
-        <p:txBody>
-          <a:bodyPr/>
-          <a:lstStyle/>
-          <a:p>
-            <a:r>
-              <a:rPr lang="en-US" sz="1400" b="1" i="0" dirty="0">
-                <a:solidFill>
-                  <a:schemeClr val="tx2"/>
-                </a:solidFill>
-                <a:effectLst/>
-              </a:rPr>
-              <a:t>F1 Score (93.10%):</a:t>
-            </a:r>
-            <a:r>
-              <a:rPr lang="en-US" sz="1400" b="0" i="0" dirty="0">
-                <a:solidFill>
-                  <a:schemeClr val="tx2"/>
-                </a:solidFill>
-                <a:effectLst/>
-              </a:rPr>
-              <a:t> The F1 score is a harmonic mean of precision and recall, providing a single metric that balances both aspects. An F1 score of 93.10% shows that the model maintains an excellent balance between identifying all wins (recall) and minimizing false wins (precision), ensuring a well-rounded performance.</a:t>
-            </a:r>
-          </a:p>
-          <a:p>
-            <a:r>
-              <a:rPr lang="en-US" sz="1400" b="1" i="0" dirty="0">
-                <a:solidFill>
-                  <a:schemeClr val="tx2"/>
-                </a:solidFill>
-                <a:effectLst/>
-              </a:rPr>
-              <a:t>Kappa (85.43%):</a:t>
-            </a:r>
-            <a:r>
-              <a:rPr lang="en-US" sz="1400" b="0" i="0" dirty="0">
-                <a:solidFill>
-                  <a:schemeClr val="tx2"/>
-                </a:solidFill>
-                <a:effectLst/>
-              </a:rPr>
-              <a:t> The Kappa statistic measures the agreement between predicted and actual outcomes, considering the agreement that might happen by chance. A Kappa score of 85.43% in predicting NFL games underscores the model's ability to make predictions that are consistently in line with actual game outcomes.</a:t>
-            </a:r>
-          </a:p>
-          <a:p>
-            <a:r>
-              <a:rPr lang="en-US" sz="1400" b="1" i="0" dirty="0">
-                <a:solidFill>
-                  <a:schemeClr val="tx2"/>
-                </a:solidFill>
-                <a:effectLst/>
-              </a:rPr>
-              <a:t>MCC (85.66%):</a:t>
-            </a:r>
-            <a:r>
-              <a:rPr lang="en-US" sz="1400" b="0" i="0" dirty="0">
-                <a:solidFill>
-                  <a:schemeClr val="tx2"/>
-                </a:solidFill>
-                <a:effectLst/>
-              </a:rPr>
-              <a:t> The Matthews Correlation Coefficient is a balanced measure that takes into account all four values of the confusion matrix (TP, FP, TN, FN). An MCC of 85.66% shows that the model performs well across all aspects of binary classification, ensuring its effectiveness even when the class distribution is unbalanced.</a:t>
-            </a:r>
-          </a:p>
-        </p:txBody>
-      </p:sp>
-      <p:sp>
-        <p:nvSpPr>
-          <p:cNvPr id="4" name="TextBox 3">
-            <a:extLst>
-              <a:ext uri="{FF2B5EF4-FFF2-40B4-BE49-F238E27FC236}">
-                <a16:creationId xmlns:a16="http://schemas.microsoft.com/office/drawing/2014/main" id="{1257DDE0-8B7A-D3DD-DA70-1B2B7020EF9B}"/>
-              </a:ext>
-            </a:extLst>
-          </p:cNvPr>
-          <p:cNvSpPr txBox="1"/>
-          <p:nvPr/>
-        </p:nvSpPr>
-        <p:spPr>
-          <a:xfrm>
-            <a:off x="1059443" y="4483713"/>
-            <a:ext cx="10033175" cy="1169551"/>
-          </a:xfrm>
-          <a:prstGeom prst="rect">
-            <a:avLst/>
-          </a:prstGeom>
-          <a:noFill/>
-        </p:spPr>
-        <p:txBody>
-          <a:bodyPr wrap="square" rtlCol="0">
-            <a:spAutoFit/>
-          </a:bodyPr>
-          <a:lstStyle/>
-          <a:p>
-            <a:r>
-              <a:rPr lang="en-US" sz="1400" b="0" i="0" dirty="0">
-                <a:solidFill>
-                  <a:schemeClr val="tx2"/>
-                </a:solidFill>
-                <a:effectLst/>
-                <a:latin typeface="+mn-lt"/>
-              </a:rPr>
-              <a:t>In conclusion, the combination of these metrics suggests a comprehensive picture of an effective model for predicting NFL game outcomes. It captures wins accurately, it does a good job at minimizing false predictions, balances precision and recall, reflecting in a good F1 score. Such a model could be of immense value to stakeholders in sports analytics, betting, and strategic game planning. However, continuous validation on new and diverse data is advisable to maintain and potentially improve this performance.</a:t>
-            </a:r>
-            <a:endParaRPr lang="en-US" sz="1400" dirty="0">
-              <a:solidFill>
-                <a:schemeClr val="tx2"/>
-              </a:solidFill>
-              <a:latin typeface="+mn-lt"/>
-            </a:endParaRPr>
-          </a:p>
-        </p:txBody>
-      </p:sp>
-    </p:spTree>
-    <p:extLst>
-      <p:ext uri="{BB962C8B-B14F-4D97-AF65-F5344CB8AC3E}">
-        <p14:creationId xmlns:p14="http://schemas.microsoft.com/office/powerpoint/2010/main" val="2320248754"/>
-      </p:ext>
-    </p:extLst>
-  </p:cSld>
-  <p:clrMapOvr>
-    <a:masterClrMapping/>
-  </p:clrMapOvr>
-</p:sld>
-</file>
-
 <file path=ppt/slides/slide2.xml><?xml version="1.0" encoding="utf-8"?>
 <p:sld xmlns:a="http://schemas.openxmlformats.org/drawingml/2006/main" xmlns:r="http://schemas.openxmlformats.org/officeDocument/2006/relationships" xmlns:p="http://schemas.openxmlformats.org/presentationml/2006/main">
   <p:cSld>
@@ -7682,7 +7674,7 @@
           <p:cNvPr id="2" name="Title 1">
             <a:extLst>
               <a:ext uri="{FF2B5EF4-FFF2-40B4-BE49-F238E27FC236}">
-                <a16:creationId xmlns:a16="http://schemas.microsoft.com/office/drawing/2014/main" id="{138AE1D3-5150-C106-13B8-74E6A1019079}"/>
+                <a16:creationId xmlns:a16="http://schemas.microsoft.com/office/drawing/2014/main" id="{5D0F97CD-FF7B-0082-E451-52F631255DAD}"/>
               </a:ext>
             </a:extLst>
           </p:cNvPr>
@@ -7700,7 +7692,7 @@
           <a:p>
             <a:r>
               <a:rPr lang="en-US" dirty="0"/>
-              <a:t>Objective:</a:t>
+              <a:t>Outline</a:t>
             </a:r>
           </a:p>
         </p:txBody>
@@ -7710,7 +7702,7 @@
           <p:cNvPr id="3" name="Content Placeholder 2">
             <a:extLst>
               <a:ext uri="{FF2B5EF4-FFF2-40B4-BE49-F238E27FC236}">
-                <a16:creationId xmlns:a16="http://schemas.microsoft.com/office/drawing/2014/main" id="{EA7ABA80-DADC-C110-3DB0-4E28FE369F00}"/>
+                <a16:creationId xmlns:a16="http://schemas.microsoft.com/office/drawing/2014/main" id="{24442BBD-064E-3F07-67B4-ECD76AFCBBDD}"/>
               </a:ext>
             </a:extLst>
           </p:cNvPr>
@@ -7721,60 +7713,77 @@
             <p:ph idx="1"/>
           </p:nvPr>
         </p:nvSpPr>
-        <p:spPr>
-          <a:xfrm>
-            <a:off x="814916" y="2300714"/>
-            <a:ext cx="10562167" cy="3165368"/>
-          </a:xfrm>
-        </p:spPr>
+        <p:spPr/>
         <p:txBody>
           <a:bodyPr/>
           <a:lstStyle/>
           <a:p>
-            <a:pPr marL="0" indent="0">
-              <a:buNone/>
-            </a:pPr>
             <a:r>
               <a:rPr lang="en-US" dirty="0"/>
-              <a:t>The objective of this project was to bring together two things I have a passion for... Sports and Data Science!</a:t>
-            </a:r>
-          </a:p>
-          <a:p>
-            <a:pPr marL="0" indent="0">
-              <a:buNone/>
-            </a:pPr>
+              <a:t>Executive Summary</a:t>
+            </a:r>
+          </a:p>
+          <a:p>
+            <a:r>
+              <a:rPr lang="en-US" dirty="0"/>
+              <a:t>Introduction</a:t>
+            </a:r>
+          </a:p>
+          <a:p>
+            <a:r>
+              <a:rPr lang="en-US" dirty="0"/>
+              <a:t>Data Collection Methodology</a:t>
+            </a:r>
+          </a:p>
+          <a:p>
+            <a:r>
+              <a:rPr lang="en-US" dirty="0"/>
+              <a:t>Results</a:t>
+            </a:r>
+          </a:p>
+          <a:p>
+            <a:pPr lvl="1"/>
+            <a:r>
+              <a:rPr lang="en-US" dirty="0"/>
+              <a:t>Data Wrangling and Preprocessing</a:t>
+            </a:r>
+          </a:p>
+          <a:p>
+            <a:pPr lvl="1"/>
+            <a:r>
+              <a:rPr lang="en-US" dirty="0"/>
+              <a:t>EDA</a:t>
+            </a:r>
+          </a:p>
+          <a:p>
+            <a:pPr lvl="1"/>
+            <a:r>
+              <a:rPr lang="en-US" dirty="0"/>
+              <a:t>Model Building</a:t>
+            </a:r>
+          </a:p>
+          <a:p>
+            <a:r>
+              <a:rPr lang="en-US" dirty="0"/>
+              <a:t>Conclusion</a:t>
+            </a:r>
+          </a:p>
+          <a:p>
+            <a:r>
+              <a:rPr lang="en-US" dirty="0"/>
+              <a:t>Appendix</a:t>
+            </a:r>
+          </a:p>
+          <a:p>
+            <a:pPr lvl="1"/>
             <a:endParaRPr lang="en-US" dirty="0"/>
-          </a:p>
-          <a:p>
-            <a:pPr marL="0" indent="0">
-              <a:buNone/>
-            </a:pPr>
-            <a:r>
-              <a:rPr lang="en-US" dirty="0"/>
-              <a:t>The main goal of the project was to help predict the outcome of games based on accumulated stats through out the season.</a:t>
-            </a:r>
-          </a:p>
-          <a:p>
-            <a:pPr marL="0" indent="0">
-              <a:buNone/>
-            </a:pPr>
-            <a:endParaRPr lang="en-US" dirty="0"/>
-          </a:p>
-          <a:p>
-            <a:pPr marL="0" indent="0">
-              <a:buNone/>
-            </a:pPr>
-            <a:r>
-              <a:rPr lang="en-US" dirty="0"/>
-              <a:t>As we all know, the most important part of data science is… well… the data. So lets start there.</a:t>
-            </a:r>
           </a:p>
         </p:txBody>
       </p:sp>
     </p:spTree>
     <p:extLst>
       <p:ext uri="{BB962C8B-B14F-4D97-AF65-F5344CB8AC3E}">
-        <p14:creationId xmlns:p14="http://schemas.microsoft.com/office/powerpoint/2010/main" val="261800076"/>
+        <p14:creationId xmlns:p14="http://schemas.microsoft.com/office/powerpoint/2010/main" val="4142805702"/>
       </p:ext>
     </p:extLst>
   </p:cSld>
@@ -7806,7 +7815,7 @@
           <p:cNvPr id="2" name="Title 1">
             <a:extLst>
               <a:ext uri="{FF2B5EF4-FFF2-40B4-BE49-F238E27FC236}">
-                <a16:creationId xmlns:a16="http://schemas.microsoft.com/office/drawing/2014/main" id="{DE9ACA90-2A35-AACF-48E5-F4CEFB990CFD}"/>
+                <a16:creationId xmlns:a16="http://schemas.microsoft.com/office/drawing/2014/main" id="{1886A7C9-6977-CB1D-B782-A197B509C068}"/>
               </a:ext>
             </a:extLst>
           </p:cNvPr>
@@ -7824,7 +7833,7 @@
           <a:p>
             <a:r>
               <a:rPr lang="en-US" dirty="0"/>
-              <a:t>Appendix</a:t>
+              <a:t>Conclusion:</a:t>
             </a:r>
           </a:p>
         </p:txBody>
@@ -7834,7 +7843,7 @@
           <p:cNvPr id="3" name="Content Placeholder 2">
             <a:extLst>
               <a:ext uri="{FF2B5EF4-FFF2-40B4-BE49-F238E27FC236}">
-                <a16:creationId xmlns:a16="http://schemas.microsoft.com/office/drawing/2014/main" id="{0DB118C8-D542-D9BE-7671-86549352B3AD}"/>
+                <a16:creationId xmlns:a16="http://schemas.microsoft.com/office/drawing/2014/main" id="{FCF67E0D-2958-39B6-D214-C6512F1FF746}"/>
               </a:ext>
             </a:extLst>
           </p:cNvPr>
@@ -7845,12 +7854,555 @@
             <p:ph idx="1"/>
           </p:nvPr>
         </p:nvSpPr>
-        <p:spPr/>
+        <p:spPr>
+          <a:xfrm>
+            <a:off x="814918" y="1989140"/>
+            <a:ext cx="10562167" cy="3144112"/>
+          </a:xfrm>
+        </p:spPr>
         <p:txBody>
           <a:bodyPr/>
           <a:lstStyle/>
           <a:p>
+            <a:r>
+              <a:rPr lang="en-US" sz="1400" b="1" i="0" dirty="0">
+                <a:solidFill>
+                  <a:schemeClr val="tx2"/>
+                </a:solidFill>
+                <a:effectLst/>
+                <a:cs typeface="Arial" panose="020B0604020202020204" pitchFamily="34" charset="0"/>
+              </a:rPr>
+              <a:t>Accuracy (92.73%):</a:t>
+            </a:r>
+            <a:r>
+              <a:rPr lang="en-US" sz="1400" b="0" i="0" dirty="0">
+                <a:solidFill>
+                  <a:schemeClr val="tx2"/>
+                </a:solidFill>
+                <a:effectLst/>
+                <a:cs typeface="Arial" panose="020B0604020202020204" pitchFamily="34" charset="0"/>
+              </a:rPr>
+              <a:t> This score indicates that the model correctly predicts the outcome (win/loss) of an NFL game approximately 92.73% of the time. In the context of game predictions, this high accuracy means that the model can be considered highly reliable for forecasting game results.</a:t>
+            </a:r>
+          </a:p>
+          <a:p>
+            <a:r>
+              <a:rPr lang="en-US" sz="1400" b="1" i="0" dirty="0">
+                <a:solidFill>
+                  <a:schemeClr val="tx2"/>
+                </a:solidFill>
+                <a:effectLst/>
+                <a:cs typeface="Arial" panose="020B0604020202020204" pitchFamily="34" charset="0"/>
+              </a:rPr>
+              <a:t>AUC (96.43%):</a:t>
+            </a:r>
+            <a:r>
+              <a:rPr lang="en-US" sz="1400" b="0" i="0" dirty="0">
+                <a:solidFill>
+                  <a:schemeClr val="tx2"/>
+                </a:solidFill>
+                <a:effectLst/>
+                <a:cs typeface="Arial" panose="020B0604020202020204" pitchFamily="34" charset="0"/>
+              </a:rPr>
+              <a:t> The Area Under the Receiver Operating Characteristic Curve measures the model's ability to distinguish between winning and losing outcomes. A score of 96.43% signifies excellent separation, implying that the model has a strong understanding of the factors that contribute to a win or loss.</a:t>
+            </a:r>
+          </a:p>
+          <a:p>
+            <a:r>
+              <a:rPr lang="en-US" sz="1400" b="1" i="0" dirty="0">
+                <a:solidFill>
+                  <a:schemeClr val="tx2"/>
+                </a:solidFill>
+                <a:effectLst/>
+                <a:cs typeface="Arial" panose="020B0604020202020204" pitchFamily="34" charset="0"/>
+              </a:rPr>
+              <a:t>Recall (96.43%):</a:t>
+            </a:r>
+            <a:r>
+              <a:rPr lang="en-US" sz="1400" b="0" i="0" dirty="0">
+                <a:solidFill>
+                  <a:schemeClr val="tx2"/>
+                </a:solidFill>
+                <a:effectLst/>
+                <a:cs typeface="Arial" panose="020B0604020202020204" pitchFamily="34" charset="0"/>
+              </a:rPr>
+              <a:t> Recall measures the model's ability to correctly identify all actual winning games. A high recall like 96.43% suggests that the model rarely misses a true winning game, making it valuable for applications where capturing all winning instances is crucial.</a:t>
+            </a:r>
+          </a:p>
+          <a:p>
+            <a:r>
+              <a:rPr lang="en-US" sz="1400" b="1" i="0" dirty="0">
+                <a:solidFill>
+                  <a:schemeClr val="tx2"/>
+                </a:solidFill>
+                <a:effectLst/>
+                <a:cs typeface="Arial" panose="020B0604020202020204" pitchFamily="34" charset="0"/>
+              </a:rPr>
+              <a:t>Precision (90.00%):</a:t>
+            </a:r>
+            <a:r>
+              <a:rPr lang="en-US" sz="1400" b="0" i="0" dirty="0">
+                <a:solidFill>
+                  <a:schemeClr val="tx2"/>
+                </a:solidFill>
+                <a:effectLst/>
+                <a:cs typeface="Arial" panose="020B0604020202020204" pitchFamily="34" charset="0"/>
+              </a:rPr>
+              <a:t> Precision assesses the model's ability to accurately predict a win without falsely identifying a loss as a win. A precision of 90% means that among the games predicted as wins, 90% were actual wins. This is particularly important in scenarios where false positives (incorrectly predicting a win) can have significant consequences, such as in betting or strategic planning.</a:t>
+            </a:r>
+          </a:p>
+        </p:txBody>
+      </p:sp>
+    </p:spTree>
+    <p:extLst>
+      <p:ext uri="{BB962C8B-B14F-4D97-AF65-F5344CB8AC3E}">
+        <p14:creationId xmlns:p14="http://schemas.microsoft.com/office/powerpoint/2010/main" val="1078846726"/>
+      </p:ext>
+    </p:extLst>
+  </p:cSld>
+  <p:clrMapOvr>
+    <a:masterClrMapping/>
+  </p:clrMapOvr>
+</p:sld>
+</file>
+
+<file path=ppt/slides/slide21.xml><?xml version="1.0" encoding="utf-8"?>
+<p:sld xmlns:a="http://schemas.openxmlformats.org/drawingml/2006/main" xmlns:r="http://schemas.openxmlformats.org/officeDocument/2006/relationships" xmlns:p="http://schemas.openxmlformats.org/presentationml/2006/main">
+  <p:cSld>
+    <p:spTree>
+      <p:nvGrpSpPr>
+        <p:cNvPr id="1" name=""/>
+        <p:cNvGrpSpPr/>
+        <p:nvPr/>
+      </p:nvGrpSpPr>
+      <p:grpSpPr>
+        <a:xfrm>
+          <a:off x="0" y="0"/>
+          <a:ext cx="0" cy="0"/>
+          <a:chOff x="0" y="0"/>
+          <a:chExt cx="0" cy="0"/>
+        </a:xfrm>
+      </p:grpSpPr>
+      <p:sp>
+        <p:nvSpPr>
+          <p:cNvPr id="2" name="Title 1">
+            <a:extLst>
+              <a:ext uri="{FF2B5EF4-FFF2-40B4-BE49-F238E27FC236}">
+                <a16:creationId xmlns:a16="http://schemas.microsoft.com/office/drawing/2014/main" id="{2265864F-5421-1F4D-A809-13983CC3EB45}"/>
+              </a:ext>
+            </a:extLst>
+          </p:cNvPr>
+          <p:cNvSpPr>
+            <a:spLocks noGrp="1"/>
+          </p:cNvSpPr>
+          <p:nvPr>
+            <p:ph type="title"/>
+          </p:nvPr>
+        </p:nvSpPr>
+        <p:spPr/>
+        <p:txBody>
+          <a:bodyPr/>
+          <a:lstStyle/>
+          <a:p>
+            <a:r>
+              <a:rPr lang="en-US" dirty="0"/>
+              <a:t>Conclusion</a:t>
+            </a:r>
+            <a:br>
+              <a:rPr lang="en-US" dirty="0"/>
+            </a:br>
+            <a:r>
+              <a:rPr lang="en-US" dirty="0"/>
+              <a:t>Continued:</a:t>
+            </a:r>
+          </a:p>
+        </p:txBody>
+      </p:sp>
+      <p:sp>
+        <p:nvSpPr>
+          <p:cNvPr id="3" name="Content Placeholder 2">
+            <a:extLst>
+              <a:ext uri="{FF2B5EF4-FFF2-40B4-BE49-F238E27FC236}">
+                <a16:creationId xmlns:a16="http://schemas.microsoft.com/office/drawing/2014/main" id="{38E7855A-91D2-3B33-2D4A-90998D8461C8}"/>
+              </a:ext>
+            </a:extLst>
+          </p:cNvPr>
+          <p:cNvSpPr>
+            <a:spLocks noGrp="1"/>
+          </p:cNvSpPr>
+          <p:nvPr>
+            <p:ph idx="1"/>
+          </p:nvPr>
+        </p:nvSpPr>
+        <p:spPr>
+          <a:xfrm>
+            <a:off x="814918" y="1989140"/>
+            <a:ext cx="10562167" cy="2368450"/>
+          </a:xfrm>
+        </p:spPr>
+        <p:txBody>
+          <a:bodyPr/>
+          <a:lstStyle/>
+          <a:p>
+            <a:r>
+              <a:rPr lang="en-US" sz="1400" b="1" i="0" dirty="0">
+                <a:solidFill>
+                  <a:schemeClr val="tx2"/>
+                </a:solidFill>
+                <a:effectLst/>
+              </a:rPr>
+              <a:t>F1 Score (93.10%):</a:t>
+            </a:r>
+            <a:r>
+              <a:rPr lang="en-US" sz="1400" b="0" i="0" dirty="0">
+                <a:solidFill>
+                  <a:schemeClr val="tx2"/>
+                </a:solidFill>
+                <a:effectLst/>
+              </a:rPr>
+              <a:t> The F1 score is a harmonic mean of precision and recall, providing a single metric that balances both aspects. An F1 score of 93.10% shows that the model maintains an excellent balance between identifying all wins (recall) and minimizing false wins (precision), ensuring a well-rounded performance.</a:t>
+            </a:r>
+          </a:p>
+          <a:p>
+            <a:r>
+              <a:rPr lang="en-US" sz="1400" b="1" i="0" dirty="0">
+                <a:solidFill>
+                  <a:schemeClr val="tx2"/>
+                </a:solidFill>
+                <a:effectLst/>
+              </a:rPr>
+              <a:t>Kappa (85.43%):</a:t>
+            </a:r>
+            <a:r>
+              <a:rPr lang="en-US" sz="1400" b="0" i="0" dirty="0">
+                <a:solidFill>
+                  <a:schemeClr val="tx2"/>
+                </a:solidFill>
+                <a:effectLst/>
+              </a:rPr>
+              <a:t> The Kappa statistic measures the agreement between predicted and actual outcomes, considering the agreement that might happen by chance. A Kappa score of 85.43% in predicting NFL games underscores the model's ability to make predictions that are consistently in line with actual game outcomes.</a:t>
+            </a:r>
+          </a:p>
+          <a:p>
+            <a:r>
+              <a:rPr lang="en-US" sz="1400" b="1" i="0" dirty="0">
+                <a:solidFill>
+                  <a:schemeClr val="tx2"/>
+                </a:solidFill>
+                <a:effectLst/>
+              </a:rPr>
+              <a:t>MCC (85.66%):</a:t>
+            </a:r>
+            <a:r>
+              <a:rPr lang="en-US" sz="1400" b="0" i="0" dirty="0">
+                <a:solidFill>
+                  <a:schemeClr val="tx2"/>
+                </a:solidFill>
+                <a:effectLst/>
+              </a:rPr>
+              <a:t> The Matthews Correlation Coefficient is a balanced measure that takes into account all four values of the confusion matrix (TP, FP, TN, FN). An MCC of 85.66% shows that the model performs well across all aspects of binary classification, ensuring its effectiveness even when the class distribution is unbalanced.</a:t>
+            </a:r>
+          </a:p>
+        </p:txBody>
+      </p:sp>
+      <p:sp>
+        <p:nvSpPr>
+          <p:cNvPr id="4" name="TextBox 3">
+            <a:extLst>
+              <a:ext uri="{FF2B5EF4-FFF2-40B4-BE49-F238E27FC236}">
+                <a16:creationId xmlns:a16="http://schemas.microsoft.com/office/drawing/2014/main" id="{1257DDE0-8B7A-D3DD-DA70-1B2B7020EF9B}"/>
+              </a:ext>
+            </a:extLst>
+          </p:cNvPr>
+          <p:cNvSpPr txBox="1"/>
+          <p:nvPr/>
+        </p:nvSpPr>
+        <p:spPr>
+          <a:xfrm>
+            <a:off x="1059443" y="4483713"/>
+            <a:ext cx="10033175" cy="1169551"/>
+          </a:xfrm>
+          <a:prstGeom prst="rect">
+            <a:avLst/>
+          </a:prstGeom>
+          <a:noFill/>
+        </p:spPr>
+        <p:txBody>
+          <a:bodyPr wrap="square" rtlCol="0">
+            <a:spAutoFit/>
+          </a:bodyPr>
+          <a:lstStyle/>
+          <a:p>
+            <a:r>
+              <a:rPr lang="en-US" sz="1400" b="0" i="0" dirty="0">
+                <a:solidFill>
+                  <a:schemeClr val="tx2"/>
+                </a:solidFill>
+                <a:effectLst/>
+                <a:latin typeface="+mn-lt"/>
+              </a:rPr>
+              <a:t>In conclusion, the combination of these metrics suggests a comprehensive picture of an effective model for predicting NFL game outcomes. It captures wins accurately, it does a good job at minimizing false predictions, balances precision and recall, reflecting in a good F1 score. Such a model could be of immense value to stakeholders in sports analytics, betting, and strategic game planning. However, continuous validation on new and diverse data is advisable to maintain and potentially improve this performance.</a:t>
+            </a:r>
+            <a:endParaRPr lang="en-US" sz="1400" dirty="0">
+              <a:solidFill>
+                <a:schemeClr val="tx2"/>
+              </a:solidFill>
+              <a:latin typeface="+mn-lt"/>
+            </a:endParaRPr>
+          </a:p>
+        </p:txBody>
+      </p:sp>
+    </p:spTree>
+    <p:extLst>
+      <p:ext uri="{BB962C8B-B14F-4D97-AF65-F5344CB8AC3E}">
+        <p14:creationId xmlns:p14="http://schemas.microsoft.com/office/powerpoint/2010/main" val="2320248754"/>
+      </p:ext>
+    </p:extLst>
+  </p:cSld>
+  <p:clrMapOvr>
+    <a:masterClrMapping/>
+  </p:clrMapOvr>
+</p:sld>
+</file>
+
+<file path=ppt/slides/slide22.xml><?xml version="1.0" encoding="utf-8"?>
+<p:sld xmlns:a="http://schemas.openxmlformats.org/drawingml/2006/main" xmlns:r="http://schemas.openxmlformats.org/officeDocument/2006/relationships" xmlns:p="http://schemas.openxmlformats.org/presentationml/2006/main">
+  <p:cSld>
+    <p:spTree>
+      <p:nvGrpSpPr>
+        <p:cNvPr id="1" name=""/>
+        <p:cNvGrpSpPr/>
+        <p:nvPr/>
+      </p:nvGrpSpPr>
+      <p:grpSpPr>
+        <a:xfrm>
+          <a:off x="0" y="0"/>
+          <a:ext cx="0" cy="0"/>
+          <a:chOff x="0" y="0"/>
+          <a:chExt cx="0" cy="0"/>
+        </a:xfrm>
+      </p:grpSpPr>
+      <p:sp>
+        <p:nvSpPr>
+          <p:cNvPr id="2" name="Title 1">
+            <a:extLst>
+              <a:ext uri="{FF2B5EF4-FFF2-40B4-BE49-F238E27FC236}">
+                <a16:creationId xmlns:a16="http://schemas.microsoft.com/office/drawing/2014/main" id="{DE9ACA90-2A35-AACF-48E5-F4CEFB990CFD}"/>
+              </a:ext>
+            </a:extLst>
+          </p:cNvPr>
+          <p:cNvSpPr>
+            <a:spLocks noGrp="1"/>
+          </p:cNvSpPr>
+          <p:nvPr>
+            <p:ph type="title"/>
+          </p:nvPr>
+        </p:nvSpPr>
+        <p:spPr/>
+        <p:txBody>
+          <a:bodyPr/>
+          <a:lstStyle/>
+          <a:p>
+            <a:r>
+              <a:rPr lang="en-US" dirty="0"/>
+              <a:t>Appendix</a:t>
+            </a:r>
+          </a:p>
+        </p:txBody>
+      </p:sp>
+      <p:sp>
+        <p:nvSpPr>
+          <p:cNvPr id="3" name="Content Placeholder 2">
+            <a:extLst>
+              <a:ext uri="{FF2B5EF4-FFF2-40B4-BE49-F238E27FC236}">
+                <a16:creationId xmlns:a16="http://schemas.microsoft.com/office/drawing/2014/main" id="{0DB118C8-D542-D9BE-7671-86549352B3AD}"/>
+              </a:ext>
+            </a:extLst>
+          </p:cNvPr>
+          <p:cNvSpPr>
+            <a:spLocks noGrp="1"/>
+          </p:cNvSpPr>
+          <p:nvPr>
+            <p:ph idx="1"/>
+          </p:nvPr>
+        </p:nvSpPr>
+        <p:spPr>
+          <a:xfrm>
+            <a:off x="6354555" y="2014955"/>
+            <a:ext cx="4860668" cy="4103687"/>
+          </a:xfrm>
+        </p:spPr>
+        <p:txBody>
+          <a:bodyPr/>
+          <a:lstStyle/>
+          <a:p>
+            <a:r>
+              <a:rPr lang="en-US" dirty="0">
+                <a:hlinkClick r:id="rId2"/>
+              </a:rPr>
+              <a:t>Data Files</a:t>
+            </a:r>
             <a:endParaRPr lang="en-US" dirty="0"/>
+          </a:p>
+          <a:p>
+            <a:endParaRPr lang="en-US" dirty="0"/>
+          </a:p>
+          <a:p>
+            <a:r>
+              <a:rPr lang="en-US" dirty="0">
+                <a:hlinkClick r:id="rId3"/>
+              </a:rPr>
+              <a:t>Website data was scraped from</a:t>
+            </a:r>
+            <a:endParaRPr lang="en-US" dirty="0"/>
+          </a:p>
+          <a:p>
+            <a:endParaRPr lang="en-US" dirty="0"/>
+          </a:p>
+          <a:p>
+            <a:r>
+              <a:rPr lang="en-US" dirty="0">
+                <a:hlinkClick r:id="rId4"/>
+              </a:rPr>
+              <a:t>More evaluation images</a:t>
+            </a:r>
+            <a:endParaRPr lang="en-US" dirty="0"/>
+          </a:p>
+        </p:txBody>
+      </p:sp>
+      <p:sp>
+        <p:nvSpPr>
+          <p:cNvPr id="5" name="TextBox 4">
+            <a:extLst>
+              <a:ext uri="{FF2B5EF4-FFF2-40B4-BE49-F238E27FC236}">
+                <a16:creationId xmlns:a16="http://schemas.microsoft.com/office/drawing/2014/main" id="{FB9CD916-88EC-812E-8E1D-AF5B5AD4F0D7}"/>
+              </a:ext>
+            </a:extLst>
+          </p:cNvPr>
+          <p:cNvSpPr txBox="1"/>
+          <p:nvPr/>
+        </p:nvSpPr>
+        <p:spPr>
+          <a:xfrm>
+            <a:off x="479272" y="2115263"/>
+            <a:ext cx="4730339" cy="3539430"/>
+          </a:xfrm>
+          <a:prstGeom prst="rect">
+            <a:avLst/>
+          </a:prstGeom>
+          <a:noFill/>
+        </p:spPr>
+        <p:txBody>
+          <a:bodyPr wrap="square" rtlCol="0">
+            <a:spAutoFit/>
+          </a:bodyPr>
+          <a:lstStyle/>
+          <a:p>
+            <a:pPr marL="342900" indent="-342900">
+              <a:buFont typeface="Arial" panose="020B0604020202020204" pitchFamily="34" charset="0"/>
+              <a:buChar char="•"/>
+            </a:pPr>
+            <a:r>
+              <a:rPr lang="en-US" sz="2000" b="0" dirty="0">
+                <a:hlinkClick r:id="rId5"/>
+              </a:rPr>
+              <a:t>Creator's LinkedIn</a:t>
+            </a:r>
+            <a:endParaRPr lang="en-US" sz="2000" b="0" dirty="0"/>
+          </a:p>
+          <a:p>
+            <a:pPr marL="342900" indent="-342900">
+              <a:buFont typeface="Arial" panose="020B0604020202020204" pitchFamily="34" charset="0"/>
+              <a:buChar char="•"/>
+            </a:pPr>
+            <a:endParaRPr lang="en-US" sz="2000" b="0" dirty="0"/>
+          </a:p>
+          <a:p>
+            <a:pPr marL="342900" indent="-342900">
+              <a:buFont typeface="Arial" panose="020B0604020202020204" pitchFamily="34" charset="0"/>
+              <a:buChar char="•"/>
+            </a:pPr>
+            <a:r>
+              <a:rPr lang="en-US" sz="2000" b="0" dirty="0">
+                <a:hlinkClick r:id="rId6"/>
+              </a:rPr>
+              <a:t>Creator's Github Dashboard</a:t>
+            </a:r>
+            <a:endParaRPr lang="en-US" sz="2000" b="0" dirty="0"/>
+          </a:p>
+          <a:p>
+            <a:pPr marL="342900" indent="-342900">
+              <a:buFont typeface="Arial" panose="020B0604020202020204" pitchFamily="34" charset="0"/>
+              <a:buChar char="•"/>
+            </a:pPr>
+            <a:endParaRPr lang="en-US" sz="2000" b="0" dirty="0"/>
+          </a:p>
+          <a:p>
+            <a:pPr marL="342900" indent="-342900">
+              <a:buFont typeface="Arial" panose="020B0604020202020204" pitchFamily="34" charset="0"/>
+              <a:buChar char="•"/>
+            </a:pPr>
+            <a:r>
+              <a:rPr lang="en-US" sz="2000" b="0" dirty="0">
+                <a:hlinkClick r:id="rId7"/>
+              </a:rPr>
+              <a:t>Project Repository</a:t>
+            </a:r>
+            <a:endParaRPr lang="en-US" sz="2000" b="0" dirty="0"/>
+          </a:p>
+          <a:p>
+            <a:pPr marL="342900" indent="-342900">
+              <a:buFont typeface="Arial" panose="020B0604020202020204" pitchFamily="34" charset="0"/>
+              <a:buChar char="•"/>
+            </a:pPr>
+            <a:endParaRPr lang="en-US" sz="2000" b="0" dirty="0"/>
+          </a:p>
+          <a:p>
+            <a:pPr marL="342900" indent="-342900">
+              <a:buFont typeface="Arial" panose="020B0604020202020204" pitchFamily="34" charset="0"/>
+              <a:buChar char="•"/>
+            </a:pPr>
+            <a:r>
+              <a:rPr lang="en-US" sz="2000" b="0" dirty="0">
+                <a:hlinkClick r:id="rId8"/>
+              </a:rPr>
+              <a:t>Data Cleaning Script</a:t>
+            </a:r>
+            <a:endParaRPr lang="en-US" sz="2000" b="0" dirty="0"/>
+          </a:p>
+          <a:p>
+            <a:pPr marL="342900" indent="-342900">
+              <a:buFont typeface="Arial" panose="020B0604020202020204" pitchFamily="34" charset="0"/>
+              <a:buChar char="•"/>
+            </a:pPr>
+            <a:endParaRPr lang="en-US" sz="2000" b="0" dirty="0"/>
+          </a:p>
+          <a:p>
+            <a:pPr marL="342900" indent="-342900">
+              <a:buFont typeface="Arial" panose="020B0604020202020204" pitchFamily="34" charset="0"/>
+              <a:buChar char="•"/>
+            </a:pPr>
+            <a:r>
+              <a:rPr lang="en-US" sz="2000" b="0" dirty="0">
+                <a:hlinkClick r:id="rId9"/>
+              </a:rPr>
+              <a:t>Correction of NFL Team Name code</a:t>
+            </a:r>
+            <a:endParaRPr lang="en-US" sz="2000" b="0" dirty="0"/>
+          </a:p>
+          <a:p>
+            <a:pPr marL="342900" indent="-342900">
+              <a:buFont typeface="Arial" panose="020B0604020202020204" pitchFamily="34" charset="0"/>
+              <a:buChar char="•"/>
+            </a:pPr>
+            <a:endParaRPr lang="en-US" sz="2400" dirty="0"/>
+          </a:p>
+          <a:p>
+            <a:pPr marL="342900" indent="-342900">
+              <a:buFont typeface="Arial" panose="020B0604020202020204" pitchFamily="34" charset="0"/>
+              <a:buChar char="•"/>
+            </a:pPr>
+            <a:endParaRPr lang="en-US" sz="2000" b="0" dirty="0"/>
           </a:p>
         </p:txBody>
       </p:sp>
@@ -7889,6 +8441,675 @@
           <p:cNvPr id="2" name="Title 1">
             <a:extLst>
               <a:ext uri="{FF2B5EF4-FFF2-40B4-BE49-F238E27FC236}">
+                <a16:creationId xmlns:a16="http://schemas.microsoft.com/office/drawing/2014/main" id="{C315CEEC-74C5-7A69-07C1-D6C2DE4905B7}"/>
+              </a:ext>
+            </a:extLst>
+          </p:cNvPr>
+          <p:cNvSpPr>
+            <a:spLocks noGrp="1"/>
+          </p:cNvSpPr>
+          <p:nvPr>
+            <p:ph type="title"/>
+          </p:nvPr>
+        </p:nvSpPr>
+        <p:spPr>
+          <a:xfrm>
+            <a:off x="316729" y="337383"/>
+            <a:ext cx="4621032" cy="1155700"/>
+          </a:xfrm>
+        </p:spPr>
+        <p:txBody>
+          <a:bodyPr/>
+          <a:lstStyle/>
+          <a:p>
+            <a:r>
+              <a:rPr lang="en-US" dirty="0"/>
+              <a:t>Executive Summary</a:t>
+            </a:r>
+          </a:p>
+        </p:txBody>
+      </p:sp>
+      <p:sp>
+        <p:nvSpPr>
+          <p:cNvPr id="3" name="Content Placeholder 2">
+            <a:extLst>
+              <a:ext uri="{FF2B5EF4-FFF2-40B4-BE49-F238E27FC236}">
+                <a16:creationId xmlns:a16="http://schemas.microsoft.com/office/drawing/2014/main" id="{AB644159-6909-D3C4-D1B1-5F5133768A72}"/>
+              </a:ext>
+            </a:extLst>
+          </p:cNvPr>
+          <p:cNvSpPr>
+            <a:spLocks noGrp="1"/>
+          </p:cNvSpPr>
+          <p:nvPr>
+            <p:ph idx="1"/>
+          </p:nvPr>
+        </p:nvSpPr>
+        <p:spPr>
+          <a:xfrm>
+            <a:off x="474383" y="1592425"/>
+            <a:ext cx="5964255" cy="4329103"/>
+          </a:xfrm>
+        </p:spPr>
+        <p:txBody>
+          <a:bodyPr/>
+          <a:lstStyle/>
+          <a:p>
+            <a:pPr marL="0" indent="0">
+              <a:buNone/>
+            </a:pPr>
+            <a:r>
+              <a:rPr lang="en-US" sz="1200" b="1" i="0" dirty="0">
+                <a:solidFill>
+                  <a:schemeClr val="tx2"/>
+                </a:solidFill>
+                <a:effectLst/>
+              </a:rPr>
+              <a:t>Objective:</a:t>
+            </a:r>
+            <a:r>
+              <a:rPr lang="en-US" sz="1200" b="0" i="0" dirty="0">
+                <a:solidFill>
+                  <a:schemeClr val="tx2"/>
+                </a:solidFill>
+                <a:effectLst/>
+              </a:rPr>
+              <a:t> The project aimed to predict NFL game outcomes by leveraging accumulated season stats, combining a passion for both sports and data science. A model was built to forecast wins and losses, bypassing subjective methods like power rankings.</a:t>
+            </a:r>
+          </a:p>
+          <a:p>
+            <a:pPr marL="0" indent="0">
+              <a:buNone/>
+            </a:pPr>
+            <a:endParaRPr lang="en-US" sz="1200" dirty="0">
+              <a:solidFill>
+                <a:schemeClr val="tx2"/>
+              </a:solidFill>
+            </a:endParaRPr>
+          </a:p>
+          <a:p>
+            <a:pPr marL="0" indent="0">
+              <a:buNone/>
+            </a:pPr>
+            <a:r>
+              <a:rPr lang="en-US" sz="1200" b="1" i="0" dirty="0">
+                <a:solidFill>
+                  <a:schemeClr val="tx2"/>
+                </a:solidFill>
+                <a:effectLst/>
+              </a:rPr>
+              <a:t>Data Collection:</a:t>
+            </a:r>
+            <a:r>
+              <a:rPr lang="en-US" sz="1200" b="0" i="0" dirty="0">
+                <a:solidFill>
+                  <a:schemeClr val="tx2"/>
+                </a:solidFill>
+                <a:effectLst/>
+              </a:rPr>
+              <a:t> Data was scraped from a website, focusing on concrete evidence like cumulative stats across Offense, Defense, and Special Teams. The data sets were merged on "Team" and "Week" features.</a:t>
+            </a:r>
+          </a:p>
+          <a:p>
+            <a:pPr marL="0" indent="0">
+              <a:buNone/>
+            </a:pPr>
+            <a:endParaRPr lang="en-US" sz="1200" dirty="0">
+              <a:solidFill>
+                <a:schemeClr val="tx2"/>
+              </a:solidFill>
+            </a:endParaRPr>
+          </a:p>
+          <a:p>
+            <a:pPr marL="0" indent="0">
+              <a:buNone/>
+            </a:pPr>
+            <a:r>
+              <a:rPr lang="en-US" sz="1200" b="1" i="0" dirty="0">
+                <a:solidFill>
+                  <a:schemeClr val="tx2"/>
+                </a:solidFill>
+                <a:effectLst/>
+              </a:rPr>
+              <a:t>Data Preprocessing:</a:t>
+            </a:r>
+            <a:r>
+              <a:rPr lang="en-US" sz="1200" b="0" i="0" dirty="0">
+                <a:solidFill>
+                  <a:schemeClr val="tx2"/>
+                </a:solidFill>
+                <a:effectLst/>
+              </a:rPr>
+              <a:t> Preprocessing involved understanding the data, evaluating its shape, content, and null values. Techniques were applied to impute and fill missing values.</a:t>
+            </a:r>
+          </a:p>
+          <a:p>
+            <a:pPr marL="0" indent="0">
+              <a:buNone/>
+            </a:pPr>
+            <a:endParaRPr lang="en-US" sz="1200" dirty="0">
+              <a:solidFill>
+                <a:schemeClr val="tx2"/>
+              </a:solidFill>
+            </a:endParaRPr>
+          </a:p>
+          <a:p>
+            <a:pPr marL="0" indent="0">
+              <a:buNone/>
+            </a:pPr>
+            <a:r>
+              <a:rPr lang="en-US" sz="1200" b="1" i="0" dirty="0">
+                <a:solidFill>
+                  <a:schemeClr val="tx2"/>
+                </a:solidFill>
+                <a:effectLst/>
+              </a:rPr>
+              <a:t>EDA (Exploratory Data Analysis):</a:t>
+            </a:r>
+            <a:r>
+              <a:rPr lang="en-US" sz="1200" b="0" i="0" dirty="0">
+                <a:solidFill>
+                  <a:schemeClr val="tx2"/>
+                </a:solidFill>
+                <a:effectLst/>
+              </a:rPr>
+              <a:t> Redundant and uncorrelated features were removed, with Principal Component Analysis (PCA) and feature standardization applied.</a:t>
+            </a:r>
+          </a:p>
+          <a:p>
+            <a:pPr marL="0" indent="0">
+              <a:buNone/>
+            </a:pPr>
+            <a:endParaRPr lang="en-US" sz="1200" dirty="0">
+              <a:solidFill>
+                <a:schemeClr val="tx2"/>
+              </a:solidFill>
+            </a:endParaRPr>
+          </a:p>
+          <a:p>
+            <a:pPr marL="0" indent="0">
+              <a:buNone/>
+            </a:pPr>
+            <a:r>
+              <a:rPr lang="en-US" sz="1200" b="1" i="0" dirty="0">
+                <a:solidFill>
+                  <a:schemeClr val="tx2"/>
+                </a:solidFill>
+                <a:effectLst/>
+              </a:rPr>
+              <a:t>Model Building:</a:t>
+            </a:r>
+            <a:r>
+              <a:rPr lang="en-US" sz="1200" b="0" i="0" dirty="0">
+                <a:solidFill>
+                  <a:schemeClr val="tx2"/>
+                </a:solidFill>
+                <a:effectLst/>
+              </a:rPr>
+              <a:t> </a:t>
+            </a:r>
+            <a:r>
+              <a:rPr lang="en-US" sz="1200" b="0" i="0" dirty="0" err="1">
+                <a:solidFill>
+                  <a:schemeClr val="tx2"/>
+                </a:solidFill>
+                <a:effectLst/>
+              </a:rPr>
+              <a:t>PyCaret</a:t>
+            </a:r>
+            <a:r>
+              <a:rPr lang="en-US" sz="1200" b="0" i="0" dirty="0">
+                <a:solidFill>
+                  <a:schemeClr val="tx2"/>
+                </a:solidFill>
+                <a:effectLst/>
+              </a:rPr>
+              <a:t> was utilized for model building due to its simplicity and integration with many models. Logistic Regression emerged as the top candidate, with Ridge Classifier, Linear Discriminant Analysis, and Light Gradient Boosting Machine following closely. The final model chosen was a Stacked tuned model, considering various metrics.</a:t>
+            </a:r>
+            <a:endParaRPr lang="en-US" sz="1200" dirty="0">
+              <a:solidFill>
+                <a:schemeClr val="tx2"/>
+              </a:solidFill>
+            </a:endParaRPr>
+          </a:p>
+        </p:txBody>
+      </p:sp>
+      <p:sp>
+        <p:nvSpPr>
+          <p:cNvPr id="4" name="TextBox 3">
+            <a:extLst>
+              <a:ext uri="{FF2B5EF4-FFF2-40B4-BE49-F238E27FC236}">
+                <a16:creationId xmlns:a16="http://schemas.microsoft.com/office/drawing/2014/main" id="{D722D9D1-4320-5733-3DCB-D4F1B4040972}"/>
+              </a:ext>
+            </a:extLst>
+          </p:cNvPr>
+          <p:cNvSpPr txBox="1"/>
+          <p:nvPr/>
+        </p:nvSpPr>
+        <p:spPr>
+          <a:xfrm>
+            <a:off x="6791785" y="1592425"/>
+            <a:ext cx="5013434" cy="3323987"/>
+          </a:xfrm>
+          <a:prstGeom prst="rect">
+            <a:avLst/>
+          </a:prstGeom>
+          <a:noFill/>
+        </p:spPr>
+        <p:txBody>
+          <a:bodyPr wrap="square" rtlCol="0">
+            <a:spAutoFit/>
+          </a:bodyPr>
+          <a:lstStyle/>
+          <a:p>
+            <a:pPr algn="l"/>
+            <a:r>
+              <a:rPr lang="en-US" sz="1200" b="1" i="0" dirty="0">
+                <a:solidFill>
+                  <a:schemeClr val="tx2"/>
+                </a:solidFill>
+                <a:effectLst/>
+                <a:latin typeface="+mn-lt"/>
+              </a:rPr>
+              <a:t>Model Performance:</a:t>
+            </a:r>
+            <a:endParaRPr lang="en-US" sz="1200" b="0" i="0" dirty="0">
+              <a:solidFill>
+                <a:schemeClr val="tx2"/>
+              </a:solidFill>
+              <a:effectLst/>
+              <a:latin typeface="+mn-lt"/>
+            </a:endParaRPr>
+          </a:p>
+          <a:p>
+            <a:pPr algn="l">
+              <a:buFont typeface="Arial" panose="020B0604020202020204" pitchFamily="34" charset="0"/>
+              <a:buChar char="•"/>
+            </a:pPr>
+            <a:r>
+              <a:rPr lang="en-US" sz="1200" b="1" i="0" dirty="0">
+                <a:solidFill>
+                  <a:schemeClr val="tx2"/>
+                </a:solidFill>
+                <a:effectLst/>
+                <a:latin typeface="+mn-lt"/>
+              </a:rPr>
+              <a:t>Accuracy (92.73%):</a:t>
+            </a:r>
+            <a:r>
+              <a:rPr lang="en-US" sz="1200" b="0" i="0" dirty="0">
+                <a:solidFill>
+                  <a:schemeClr val="tx2"/>
+                </a:solidFill>
+                <a:effectLst/>
+                <a:latin typeface="+mn-lt"/>
+              </a:rPr>
+              <a:t> Indicates highly reliable forecasts.</a:t>
+            </a:r>
+          </a:p>
+          <a:p>
+            <a:pPr algn="l">
+              <a:buFont typeface="Arial" panose="020B0604020202020204" pitchFamily="34" charset="0"/>
+              <a:buChar char="•"/>
+            </a:pPr>
+            <a:r>
+              <a:rPr lang="en-US" sz="1200" b="1" i="0" dirty="0">
+                <a:solidFill>
+                  <a:schemeClr val="tx2"/>
+                </a:solidFill>
+                <a:effectLst/>
+                <a:latin typeface="+mn-lt"/>
+              </a:rPr>
+              <a:t>AUC (96.43%):</a:t>
+            </a:r>
+            <a:r>
+              <a:rPr lang="en-US" sz="1200" b="0" i="0" dirty="0">
+                <a:solidFill>
+                  <a:schemeClr val="tx2"/>
+                </a:solidFill>
+                <a:effectLst/>
+                <a:latin typeface="+mn-lt"/>
+              </a:rPr>
+              <a:t> Signifies excellent separation between win and loss.</a:t>
+            </a:r>
+          </a:p>
+          <a:p>
+            <a:pPr algn="l">
+              <a:buFont typeface="Arial" panose="020B0604020202020204" pitchFamily="34" charset="0"/>
+              <a:buChar char="•"/>
+            </a:pPr>
+            <a:r>
+              <a:rPr lang="en-US" sz="1200" b="1" i="0" dirty="0">
+                <a:solidFill>
+                  <a:schemeClr val="tx2"/>
+                </a:solidFill>
+                <a:effectLst/>
+                <a:latin typeface="+mn-lt"/>
+              </a:rPr>
+              <a:t>Recall (96.43%):</a:t>
+            </a:r>
+            <a:r>
+              <a:rPr lang="en-US" sz="1200" b="0" i="0" dirty="0">
+                <a:solidFill>
+                  <a:schemeClr val="tx2"/>
+                </a:solidFill>
+                <a:effectLst/>
+                <a:latin typeface="+mn-lt"/>
+              </a:rPr>
+              <a:t> Ensures capturing all winning instances.</a:t>
+            </a:r>
+          </a:p>
+          <a:p>
+            <a:pPr algn="l">
+              <a:buFont typeface="Arial" panose="020B0604020202020204" pitchFamily="34" charset="0"/>
+              <a:buChar char="•"/>
+            </a:pPr>
+            <a:r>
+              <a:rPr lang="en-US" sz="1200" b="1" i="0" dirty="0">
+                <a:solidFill>
+                  <a:schemeClr val="tx2"/>
+                </a:solidFill>
+                <a:effectLst/>
+                <a:latin typeface="+mn-lt"/>
+              </a:rPr>
+              <a:t>Precision (90.00%):</a:t>
+            </a:r>
+            <a:r>
+              <a:rPr lang="en-US" sz="1200" b="0" i="0" dirty="0">
+                <a:solidFill>
+                  <a:schemeClr val="tx2"/>
+                </a:solidFill>
+                <a:effectLst/>
+                <a:latin typeface="+mn-lt"/>
+              </a:rPr>
+              <a:t> Important for minimizing false win predictions.</a:t>
+            </a:r>
+          </a:p>
+          <a:p>
+            <a:pPr algn="l">
+              <a:buFont typeface="Arial" panose="020B0604020202020204" pitchFamily="34" charset="0"/>
+              <a:buChar char="•"/>
+            </a:pPr>
+            <a:r>
+              <a:rPr lang="en-US" sz="1200" b="1" i="0" dirty="0">
+                <a:solidFill>
+                  <a:schemeClr val="tx2"/>
+                </a:solidFill>
+                <a:effectLst/>
+                <a:latin typeface="+mn-lt"/>
+              </a:rPr>
+              <a:t>F1 Score (93.10%):</a:t>
+            </a:r>
+            <a:r>
+              <a:rPr lang="en-US" sz="1200" b="0" i="0" dirty="0">
+                <a:solidFill>
+                  <a:schemeClr val="tx2"/>
+                </a:solidFill>
+                <a:effectLst/>
+                <a:latin typeface="+mn-lt"/>
+              </a:rPr>
+              <a:t> Reflects a well-rounded performance, balancing precision and recall.</a:t>
+            </a:r>
+          </a:p>
+          <a:p>
+            <a:pPr algn="l">
+              <a:buFont typeface="Arial" panose="020B0604020202020204" pitchFamily="34" charset="0"/>
+              <a:buChar char="•"/>
+            </a:pPr>
+            <a:r>
+              <a:rPr lang="en-US" sz="1200" b="1" i="0" dirty="0">
+                <a:solidFill>
+                  <a:schemeClr val="tx2"/>
+                </a:solidFill>
+                <a:effectLst/>
+                <a:latin typeface="+mn-lt"/>
+              </a:rPr>
+              <a:t>Kappa (85.43%):</a:t>
+            </a:r>
+            <a:r>
+              <a:rPr lang="en-US" sz="1200" b="0" i="0" dirty="0">
+                <a:solidFill>
+                  <a:schemeClr val="tx2"/>
+                </a:solidFill>
+                <a:effectLst/>
+                <a:latin typeface="+mn-lt"/>
+              </a:rPr>
+              <a:t> Underscores consistent predictions.</a:t>
+            </a:r>
+          </a:p>
+          <a:p>
+            <a:pPr algn="l">
+              <a:buFont typeface="Arial" panose="020B0604020202020204" pitchFamily="34" charset="0"/>
+              <a:buChar char="•"/>
+            </a:pPr>
+            <a:r>
+              <a:rPr lang="en-US" sz="1200" b="1" i="0" dirty="0">
+                <a:solidFill>
+                  <a:schemeClr val="tx2"/>
+                </a:solidFill>
+                <a:effectLst/>
+                <a:latin typeface="+mn-lt"/>
+              </a:rPr>
+              <a:t>MCC (85.66%):</a:t>
+            </a:r>
+            <a:r>
+              <a:rPr lang="en-US" sz="1200" b="0" i="0" dirty="0">
+                <a:solidFill>
+                  <a:schemeClr val="tx2"/>
+                </a:solidFill>
+                <a:effectLst/>
+                <a:latin typeface="+mn-lt"/>
+              </a:rPr>
+              <a:t> Demonstrates effectiveness across all aspects of binary classification.</a:t>
+            </a:r>
+          </a:p>
+          <a:p>
+            <a:pPr algn="l">
+              <a:buFont typeface="Arial" panose="020B0604020202020204" pitchFamily="34" charset="0"/>
+              <a:buChar char="•"/>
+            </a:pPr>
+            <a:endParaRPr lang="en-US" sz="1200" b="0" dirty="0">
+              <a:solidFill>
+                <a:schemeClr val="tx2"/>
+              </a:solidFill>
+              <a:latin typeface="+mn-lt"/>
+            </a:endParaRPr>
+          </a:p>
+          <a:p>
+            <a:pPr algn="l">
+              <a:buFont typeface="Arial" panose="020B0604020202020204" pitchFamily="34" charset="0"/>
+              <a:buChar char="•"/>
+            </a:pPr>
+            <a:r>
+              <a:rPr lang="en-US" sz="1200" b="1" i="0" dirty="0">
+                <a:solidFill>
+                  <a:schemeClr val="tx2"/>
+                </a:solidFill>
+                <a:effectLst/>
+                <a:latin typeface="+mn-lt"/>
+              </a:rPr>
+              <a:t>Conclusion:</a:t>
+            </a:r>
+            <a:r>
+              <a:rPr lang="en-US" sz="1200" b="0" i="0" dirty="0">
+                <a:solidFill>
+                  <a:schemeClr val="tx2"/>
+                </a:solidFill>
+                <a:effectLst/>
+                <a:latin typeface="+mn-lt"/>
+              </a:rPr>
+              <a:t> The model demonstrates a robust ability to predict NFL game outcomes, with high accuracy, precision, recall, and other substantial metrics. It could be vital for stakeholders in sports analytics, betting, and strategic planning. Continuous validation on new data is recommended to sustain or enhance performance.</a:t>
+            </a:r>
+          </a:p>
+          <a:p>
+            <a:endParaRPr lang="en-US" dirty="0"/>
+          </a:p>
+        </p:txBody>
+      </p:sp>
+    </p:spTree>
+    <p:extLst>
+      <p:ext uri="{BB962C8B-B14F-4D97-AF65-F5344CB8AC3E}">
+        <p14:creationId xmlns:p14="http://schemas.microsoft.com/office/powerpoint/2010/main" val="79875309"/>
+      </p:ext>
+    </p:extLst>
+  </p:cSld>
+  <p:clrMapOvr>
+    <a:masterClrMapping/>
+  </p:clrMapOvr>
+</p:sld>
+</file>
+
+<file path=ppt/slides/slide4.xml><?xml version="1.0" encoding="utf-8"?>
+<p:sld xmlns:a="http://schemas.openxmlformats.org/drawingml/2006/main" xmlns:r="http://schemas.openxmlformats.org/officeDocument/2006/relationships" xmlns:p="http://schemas.openxmlformats.org/presentationml/2006/main">
+  <p:cSld>
+    <p:spTree>
+      <p:nvGrpSpPr>
+        <p:cNvPr id="1" name=""/>
+        <p:cNvGrpSpPr/>
+        <p:nvPr/>
+      </p:nvGrpSpPr>
+      <p:grpSpPr>
+        <a:xfrm>
+          <a:off x="0" y="0"/>
+          <a:ext cx="0" cy="0"/>
+          <a:chOff x="0" y="0"/>
+          <a:chExt cx="0" cy="0"/>
+        </a:xfrm>
+      </p:grpSpPr>
+      <p:sp>
+        <p:nvSpPr>
+          <p:cNvPr id="2" name="Title 1">
+            <a:extLst>
+              <a:ext uri="{FF2B5EF4-FFF2-40B4-BE49-F238E27FC236}">
+                <a16:creationId xmlns:a16="http://schemas.microsoft.com/office/drawing/2014/main" id="{138AE1D3-5150-C106-13B8-74E6A1019079}"/>
+              </a:ext>
+            </a:extLst>
+          </p:cNvPr>
+          <p:cNvSpPr>
+            <a:spLocks noGrp="1"/>
+          </p:cNvSpPr>
+          <p:nvPr>
+            <p:ph type="title"/>
+          </p:nvPr>
+        </p:nvSpPr>
+        <p:spPr>
+          <a:xfrm>
+            <a:off x="814916" y="707893"/>
+            <a:ext cx="10562167" cy="1155700"/>
+          </a:xfrm>
+        </p:spPr>
+        <p:txBody>
+          <a:bodyPr/>
+          <a:lstStyle/>
+          <a:p>
+            <a:r>
+              <a:rPr lang="en-US" dirty="0"/>
+              <a:t>Introduction:</a:t>
+            </a:r>
+          </a:p>
+        </p:txBody>
+      </p:sp>
+      <p:sp>
+        <p:nvSpPr>
+          <p:cNvPr id="3" name="Content Placeholder 2">
+            <a:extLst>
+              <a:ext uri="{FF2B5EF4-FFF2-40B4-BE49-F238E27FC236}">
+                <a16:creationId xmlns:a16="http://schemas.microsoft.com/office/drawing/2014/main" id="{EA7ABA80-DADC-C110-3DB0-4E28FE369F00}"/>
+              </a:ext>
+            </a:extLst>
+          </p:cNvPr>
+          <p:cNvSpPr>
+            <a:spLocks noGrp="1"/>
+          </p:cNvSpPr>
+          <p:nvPr>
+            <p:ph idx="1"/>
+          </p:nvPr>
+        </p:nvSpPr>
+        <p:spPr>
+          <a:xfrm>
+            <a:off x="814916" y="2300714"/>
+            <a:ext cx="10562167" cy="3165368"/>
+          </a:xfrm>
+        </p:spPr>
+        <p:txBody>
+          <a:bodyPr/>
+          <a:lstStyle/>
+          <a:p>
+            <a:pPr marL="0" indent="0">
+              <a:buNone/>
+            </a:pPr>
+            <a:r>
+              <a:rPr lang="en-US" dirty="0"/>
+              <a:t>The objective of this project was to bring together two things I have a passion for... Sports and Data Science!</a:t>
+            </a:r>
+          </a:p>
+          <a:p>
+            <a:pPr marL="0" indent="0">
+              <a:buNone/>
+            </a:pPr>
+            <a:endParaRPr lang="en-US" dirty="0"/>
+          </a:p>
+          <a:p>
+            <a:pPr marL="0" indent="0">
+              <a:buNone/>
+            </a:pPr>
+            <a:r>
+              <a:rPr lang="en-US" dirty="0"/>
+              <a:t>The main goal of the project was to help predict the outcome of games based on accumulated stats through out the season.</a:t>
+            </a:r>
+          </a:p>
+          <a:p>
+            <a:pPr marL="0" indent="0">
+              <a:buNone/>
+            </a:pPr>
+            <a:endParaRPr lang="en-US" dirty="0"/>
+          </a:p>
+          <a:p>
+            <a:pPr marL="0" indent="0">
+              <a:buNone/>
+            </a:pPr>
+            <a:r>
+              <a:rPr lang="en-US" dirty="0"/>
+              <a:t>As we all know, the most important part of data science is… well… the data. So lets start there.</a:t>
+            </a:r>
+          </a:p>
+        </p:txBody>
+      </p:sp>
+    </p:spTree>
+    <p:extLst>
+      <p:ext uri="{BB962C8B-B14F-4D97-AF65-F5344CB8AC3E}">
+        <p14:creationId xmlns:p14="http://schemas.microsoft.com/office/powerpoint/2010/main" val="261800076"/>
+      </p:ext>
+    </p:extLst>
+  </p:cSld>
+  <p:clrMapOvr>
+    <a:masterClrMapping/>
+  </p:clrMapOvr>
+</p:sld>
+</file>
+
+<file path=ppt/slides/slide5.xml><?xml version="1.0" encoding="utf-8"?>
+<p:sld xmlns:a="http://schemas.openxmlformats.org/drawingml/2006/main" xmlns:r="http://schemas.openxmlformats.org/officeDocument/2006/relationships" xmlns:p="http://schemas.openxmlformats.org/presentationml/2006/main">
+  <p:cSld>
+    <p:spTree>
+      <p:nvGrpSpPr>
+        <p:cNvPr id="1" name=""/>
+        <p:cNvGrpSpPr/>
+        <p:nvPr/>
+      </p:nvGrpSpPr>
+      <p:grpSpPr>
+        <a:xfrm>
+          <a:off x="0" y="0"/>
+          <a:ext cx="0" cy="0"/>
+          <a:chOff x="0" y="0"/>
+          <a:chExt cx="0" cy="0"/>
+        </a:xfrm>
+      </p:grpSpPr>
+      <p:sp>
+        <p:nvSpPr>
+          <p:cNvPr id="2" name="Title 1">
+            <a:extLst>
+              <a:ext uri="{FF2B5EF4-FFF2-40B4-BE49-F238E27FC236}">
                 <a16:creationId xmlns:a16="http://schemas.microsoft.com/office/drawing/2014/main" id="{25507601-E974-5166-AEFE-82EB61C66EFA}"/>
               </a:ext>
             </a:extLst>
@@ -8042,7 +9263,7 @@
 </p:sld>
 </file>
 
-<file path=ppt/slides/slide4.xml><?xml version="1.0" encoding="utf-8"?>
+<file path=ppt/slides/slide6.xml><?xml version="1.0" encoding="utf-8"?>
 <p:sld xmlns:a="http://schemas.openxmlformats.org/drawingml/2006/main" xmlns:r="http://schemas.openxmlformats.org/officeDocument/2006/relationships" xmlns:p="http://schemas.openxmlformats.org/presentationml/2006/main">
   <p:cSld>
     <p:spTree>
@@ -8165,7 +9386,7 @@
 </p:sld>
 </file>
 
-<file path=ppt/slides/slide5.xml><?xml version="1.0" encoding="utf-8"?>
+<file path=ppt/slides/slide7.xml><?xml version="1.0" encoding="utf-8"?>
 <p:sld xmlns:a="http://schemas.openxmlformats.org/drawingml/2006/main" xmlns:r="http://schemas.openxmlformats.org/officeDocument/2006/relationships" xmlns:p="http://schemas.openxmlformats.org/presentationml/2006/main">
   <p:cSld>
     <p:spTree>
@@ -8286,7 +9507,7 @@
 </p:sld>
 </file>
 
-<file path=ppt/slides/slide6.xml><?xml version="1.0" encoding="utf-8"?>
+<file path=ppt/slides/slide8.xml><?xml version="1.0" encoding="utf-8"?>
 <p:sld xmlns:a="http://schemas.openxmlformats.org/drawingml/2006/main" xmlns:r="http://schemas.openxmlformats.org/officeDocument/2006/relationships" xmlns:p="http://schemas.openxmlformats.org/presentationml/2006/main">
   <p:cSld>
     <p:spTree>
@@ -8495,7 +9716,7 @@
 </p:sld>
 </file>
 
-<file path=ppt/slides/slide7.xml><?xml version="1.0" encoding="utf-8"?>
+<file path=ppt/slides/slide9.xml><?xml version="1.0" encoding="utf-8"?>
 <p:sld xmlns:a="http://schemas.openxmlformats.org/drawingml/2006/main" xmlns:r="http://schemas.openxmlformats.org/officeDocument/2006/relationships" xmlns:p="http://schemas.openxmlformats.org/presentationml/2006/main">
   <p:cSld>
     <p:spTree>
@@ -8659,358 +9880,6 @@
     <p:extLst>
       <p:ext uri="{BB962C8B-B14F-4D97-AF65-F5344CB8AC3E}">
         <p14:creationId xmlns:p14="http://schemas.microsoft.com/office/powerpoint/2010/main" val="3351950392"/>
-      </p:ext>
-    </p:extLst>
-  </p:cSld>
-  <p:clrMapOvr>
-    <a:masterClrMapping/>
-  </p:clrMapOvr>
-</p:sld>
-</file>
-
-<file path=ppt/slides/slide8.xml><?xml version="1.0" encoding="utf-8"?>
-<p:sld xmlns:a="http://schemas.openxmlformats.org/drawingml/2006/main" xmlns:r="http://schemas.openxmlformats.org/officeDocument/2006/relationships" xmlns:p="http://schemas.openxmlformats.org/presentationml/2006/main">
-  <p:cSld>
-    <p:spTree>
-      <p:nvGrpSpPr>
-        <p:cNvPr id="1" name=""/>
-        <p:cNvGrpSpPr/>
-        <p:nvPr/>
-      </p:nvGrpSpPr>
-      <p:grpSpPr>
-        <a:xfrm>
-          <a:off x="0" y="0"/>
-          <a:ext cx="0" cy="0"/>
-          <a:chOff x="0" y="0"/>
-          <a:chExt cx="0" cy="0"/>
-        </a:xfrm>
-      </p:grpSpPr>
-      <p:sp>
-        <p:nvSpPr>
-          <p:cNvPr id="2" name="Title 1">
-            <a:extLst>
-              <a:ext uri="{FF2B5EF4-FFF2-40B4-BE49-F238E27FC236}">
-                <a16:creationId xmlns:a16="http://schemas.microsoft.com/office/drawing/2014/main" id="{6675A976-532A-0662-5812-9A8AC9EF2185}"/>
-              </a:ext>
-            </a:extLst>
-          </p:cNvPr>
-          <p:cNvSpPr>
-            <a:spLocks noGrp="1"/>
-          </p:cNvSpPr>
-          <p:nvPr>
-            <p:ph type="title"/>
-          </p:nvPr>
-        </p:nvSpPr>
-        <p:spPr/>
-        <p:txBody>
-          <a:bodyPr/>
-          <a:lstStyle/>
-          <a:p>
-            <a:r>
-              <a:rPr lang="en-US" dirty="0"/>
-              <a:t>EDA</a:t>
-            </a:r>
-            <a:br>
-              <a:rPr lang="en-US" dirty="0"/>
-            </a:br>
-            <a:r>
-              <a:rPr lang="en-US" dirty="0"/>
-              <a:t>Continued:</a:t>
-            </a:r>
-          </a:p>
-        </p:txBody>
-      </p:sp>
-      <p:pic>
-        <p:nvPicPr>
-          <p:cNvPr id="5" name="Content Placeholder 4" descr="A graph with numbers and a bar graph&#10;&#10;Description automatically generated with medium confidence">
-            <a:extLst>
-              <a:ext uri="{FF2B5EF4-FFF2-40B4-BE49-F238E27FC236}">
-                <a16:creationId xmlns:a16="http://schemas.microsoft.com/office/drawing/2014/main" id="{6B03BAC3-F0AD-E06A-8C38-762C6E694BB8}"/>
-              </a:ext>
-            </a:extLst>
-          </p:cNvPr>
-          <p:cNvPicPr>
-            <a:picLocks noGrp="1" noChangeAspect="1"/>
-          </p:cNvPicPr>
-          <p:nvPr>
-            <p:ph idx="1"/>
-          </p:nvPr>
-        </p:nvPicPr>
-        <p:blipFill>
-          <a:blip r:embed="rId2">
-            <a:extLst>
-              <a:ext uri="{28A0092B-C50C-407E-A947-70E740481C1C}">
-                <a14:useLocalDpi xmlns:a14="http://schemas.microsoft.com/office/drawing/2010/main" val="0"/>
-              </a:ext>
-            </a:extLst>
-          </a:blip>
-          <a:stretch>
-            <a:fillRect/>
-          </a:stretch>
-        </p:blipFill>
-        <p:spPr>
-          <a:xfrm>
-            <a:off x="6057029" y="1844675"/>
-            <a:ext cx="6134971" cy="4089980"/>
-          </a:xfrm>
-        </p:spPr>
-      </p:pic>
-      <p:sp>
-        <p:nvSpPr>
-          <p:cNvPr id="6" name="TextBox 5">
-            <a:extLst>
-              <a:ext uri="{FF2B5EF4-FFF2-40B4-BE49-F238E27FC236}">
-                <a16:creationId xmlns:a16="http://schemas.microsoft.com/office/drawing/2014/main" id="{29AD7016-570C-E636-A388-7080252DD0CC}"/>
-              </a:ext>
-            </a:extLst>
-          </p:cNvPr>
-          <p:cNvSpPr txBox="1"/>
-          <p:nvPr/>
-        </p:nvSpPr>
-        <p:spPr>
-          <a:xfrm>
-            <a:off x="376271" y="1844675"/>
-            <a:ext cx="5719729" cy="4555093"/>
-          </a:xfrm>
-          <a:prstGeom prst="rect">
-            <a:avLst/>
-          </a:prstGeom>
-          <a:noFill/>
-        </p:spPr>
-        <p:txBody>
-          <a:bodyPr wrap="square" rtlCol="0">
-            <a:spAutoFit/>
-          </a:bodyPr>
-          <a:lstStyle/>
-          <a:p>
-            <a:r>
-              <a:rPr lang="en-US" b="0" dirty="0">
-                <a:solidFill>
-                  <a:schemeClr val="tx2"/>
-                </a:solidFill>
-              </a:rPr>
-              <a:t>This heatmap shows the correlation between the other features and the target feature. One thing that jumps out is that some of the features are inversely correlated.</a:t>
-            </a:r>
-          </a:p>
-          <a:p>
-            <a:endParaRPr lang="en-US" b="0" dirty="0">
-              <a:solidFill>
-                <a:schemeClr val="tx2"/>
-              </a:solidFill>
-            </a:endParaRPr>
-          </a:p>
-          <a:p>
-            <a:r>
-              <a:rPr lang="en-US" b="0" dirty="0">
-                <a:solidFill>
-                  <a:schemeClr val="tx2"/>
-                </a:solidFill>
-              </a:rPr>
-              <a:t>PC3 seems to have a fairly high inverse correlation, while other did not have much correlation at all.</a:t>
-            </a:r>
-          </a:p>
-          <a:p>
-            <a:endParaRPr lang="en-US" b="0" dirty="0">
-              <a:solidFill>
-                <a:schemeClr val="tx2"/>
-              </a:solidFill>
-            </a:endParaRPr>
-          </a:p>
-          <a:p>
-            <a:r>
-              <a:rPr lang="en-US" b="0" dirty="0">
-                <a:solidFill>
-                  <a:schemeClr val="tx2"/>
-                </a:solidFill>
-              </a:rPr>
-              <a:t>This worried me at first because I did want to drop so much data that the prediction model would only be working with a small number of factors.</a:t>
-            </a:r>
-          </a:p>
-          <a:p>
-            <a:endParaRPr lang="en-US" b="0" dirty="0">
-              <a:solidFill>
-                <a:schemeClr val="tx2"/>
-              </a:solidFill>
-            </a:endParaRPr>
-          </a:p>
-          <a:p>
-            <a:r>
-              <a:rPr lang="en-US" b="0" dirty="0">
-                <a:solidFill>
-                  <a:schemeClr val="tx2"/>
-                </a:solidFill>
-              </a:rPr>
-              <a:t>Because of that I decided to continue with those features and see how the prediction power of the model came out.</a:t>
-            </a:r>
-          </a:p>
-          <a:p>
-            <a:endParaRPr lang="en-US" sz="2000" b="0" dirty="0"/>
-          </a:p>
-        </p:txBody>
-      </p:sp>
-    </p:spTree>
-    <p:extLst>
-      <p:ext uri="{BB962C8B-B14F-4D97-AF65-F5344CB8AC3E}">
-        <p14:creationId xmlns:p14="http://schemas.microsoft.com/office/powerpoint/2010/main" val="261619700"/>
-      </p:ext>
-    </p:extLst>
-  </p:cSld>
-  <p:clrMapOvr>
-    <a:masterClrMapping/>
-  </p:clrMapOvr>
-</p:sld>
-</file>
-
-<file path=ppt/slides/slide9.xml><?xml version="1.0" encoding="utf-8"?>
-<p:sld xmlns:a="http://schemas.openxmlformats.org/drawingml/2006/main" xmlns:r="http://schemas.openxmlformats.org/officeDocument/2006/relationships" xmlns:p="http://schemas.openxmlformats.org/presentationml/2006/main">
-  <p:cSld>
-    <p:spTree>
-      <p:nvGrpSpPr>
-        <p:cNvPr id="1" name=""/>
-        <p:cNvGrpSpPr/>
-        <p:nvPr/>
-      </p:nvGrpSpPr>
-      <p:grpSpPr>
-        <a:xfrm>
-          <a:off x="0" y="0"/>
-          <a:ext cx="0" cy="0"/>
-          <a:chOff x="0" y="0"/>
-          <a:chExt cx="0" cy="0"/>
-        </a:xfrm>
-      </p:grpSpPr>
-      <p:sp>
-        <p:nvSpPr>
-          <p:cNvPr id="2" name="Title 1">
-            <a:extLst>
-              <a:ext uri="{FF2B5EF4-FFF2-40B4-BE49-F238E27FC236}">
-                <a16:creationId xmlns:a16="http://schemas.microsoft.com/office/drawing/2014/main" id="{FC3C6141-472A-EF61-9BDF-A0F6BC23FF8B}"/>
-              </a:ext>
-            </a:extLst>
-          </p:cNvPr>
-          <p:cNvSpPr>
-            <a:spLocks noGrp="1"/>
-          </p:cNvSpPr>
-          <p:nvPr>
-            <p:ph type="title"/>
-          </p:nvPr>
-        </p:nvSpPr>
-        <p:spPr/>
-        <p:txBody>
-          <a:bodyPr/>
-          <a:lstStyle/>
-          <a:p>
-            <a:r>
-              <a:rPr lang="en-US" dirty="0"/>
-              <a:t>Model Building:</a:t>
-            </a:r>
-          </a:p>
-        </p:txBody>
-      </p:sp>
-      <p:sp>
-        <p:nvSpPr>
-          <p:cNvPr id="3" name="Content Placeholder 2">
-            <a:extLst>
-              <a:ext uri="{FF2B5EF4-FFF2-40B4-BE49-F238E27FC236}">
-                <a16:creationId xmlns:a16="http://schemas.microsoft.com/office/drawing/2014/main" id="{4193B80A-DCBE-4D88-75A6-7C3B5EBA5AA2}"/>
-              </a:ext>
-            </a:extLst>
-          </p:cNvPr>
-          <p:cNvSpPr>
-            <a:spLocks noGrp="1"/>
-          </p:cNvSpPr>
-          <p:nvPr>
-            <p:ph idx="1"/>
-          </p:nvPr>
-        </p:nvSpPr>
-        <p:spPr>
-          <a:xfrm>
-            <a:off x="253667" y="1717973"/>
-            <a:ext cx="11406510" cy="2223406"/>
-          </a:xfrm>
-        </p:spPr>
-        <p:txBody>
-          <a:bodyPr/>
-          <a:lstStyle/>
-          <a:p>
-            <a:pPr marL="0" indent="0">
-              <a:buNone/>
-            </a:pPr>
-            <a:r>
-              <a:rPr lang="en-US" sz="1800" dirty="0"/>
-              <a:t>Once I had examined the data I was working with, it was on to model building.</a:t>
-            </a:r>
-          </a:p>
-          <a:p>
-            <a:pPr marL="0" indent="0">
-              <a:buNone/>
-            </a:pPr>
-            <a:endParaRPr lang="en-US" sz="1800" dirty="0"/>
-          </a:p>
-          <a:p>
-            <a:pPr marL="0" indent="0">
-              <a:buNone/>
-            </a:pPr>
-            <a:r>
-              <a:rPr lang="en-US" sz="1800" dirty="0"/>
-              <a:t>To do this I decided to use PyCaret, due to its simplicity, integration with many models and overall ease of use.</a:t>
-            </a:r>
-          </a:p>
-          <a:p>
-            <a:pPr marL="0" indent="0">
-              <a:buNone/>
-            </a:pPr>
-            <a:endParaRPr lang="en-US" sz="1800" dirty="0"/>
-          </a:p>
-          <a:p>
-            <a:pPr marL="0" indent="0">
-              <a:buNone/>
-            </a:pPr>
-            <a:r>
-              <a:rPr lang="en-US" sz="1800" dirty="0"/>
-              <a:t>I first needed to determine which model or models I would use, so I ran a model comparison on the training data.</a:t>
-            </a:r>
-          </a:p>
-        </p:txBody>
-      </p:sp>
-      <p:sp>
-        <p:nvSpPr>
-          <p:cNvPr id="4" name="TextBox 3">
-            <a:extLst>
-              <a:ext uri="{FF2B5EF4-FFF2-40B4-BE49-F238E27FC236}">
-                <a16:creationId xmlns:a16="http://schemas.microsoft.com/office/drawing/2014/main" id="{AE947101-87E8-85B2-4C69-CE94CDD4DB26}"/>
-              </a:ext>
-            </a:extLst>
-          </p:cNvPr>
-          <p:cNvSpPr txBox="1"/>
-          <p:nvPr/>
-        </p:nvSpPr>
-        <p:spPr>
-          <a:xfrm>
-            <a:off x="253667" y="3941379"/>
-            <a:ext cx="11406509" cy="923330"/>
-          </a:xfrm>
-          <a:prstGeom prst="rect">
-            <a:avLst/>
-          </a:prstGeom>
-          <a:noFill/>
-        </p:spPr>
-        <p:txBody>
-          <a:bodyPr wrap="square" rtlCol="0">
-            <a:spAutoFit/>
-          </a:bodyPr>
-          <a:lstStyle/>
-          <a:p>
-            <a:r>
-              <a:rPr lang="en-US" b="0" dirty="0"/>
-              <a:t>I split our whole data into 2 parts. 10% would be set aside as a validation, and the rest would be used in experiment setup. It should be noted that PyCaret makes a holdout set when you use the setup experiment method. In this case, I chose to take 15% of the data as a holdout set.</a:t>
-            </a:r>
-          </a:p>
-        </p:txBody>
-      </p:sp>
-    </p:spTree>
-    <p:extLst>
-      <p:ext uri="{BB962C8B-B14F-4D97-AF65-F5344CB8AC3E}">
-        <p14:creationId xmlns:p14="http://schemas.microsoft.com/office/powerpoint/2010/main" val="3211096387"/>
       </p:ext>
     </p:extLst>
   </p:cSld>

</xml_diff>